<commit_message>
implemented presentation generation with templates
</commit_message>
<xml_diff>
--- a/my_presentation_modified.pptx
+++ b/my_presentation_modified.pptx
@@ -2,27 +2,21 @@
 <file path=ppt/presentation.xml><?xml version="1.0" encoding="utf-8"?>
 <p:presentation xmlns:a="http://schemas.openxmlformats.org/drawingml/2006/main" xmlns:r="http://schemas.openxmlformats.org/officeDocument/2006/relationships" xmlns:p="http://schemas.openxmlformats.org/presentationml/2006/main" saveSubsetFonts="1" autoCompressPictures="0">
   <p:sldMasterIdLst>
-    <p:sldMasterId id="2147483648" r:id="rId1"/>
+    <p:sldMasterId id="2147483672" r:id="rId1"/>
   </p:sldMasterIdLst>
   <p:sldIdLst>
-    <p:sldId id="256" r:id="rId7"/>
-    <p:sldId id="257" r:id="rId8"/>
-    <p:sldId id="258" r:id="rId9"/>
-    <p:sldId id="259" r:id="rId10"/>
-    <p:sldId id="260" r:id="rId11"/>
-    <p:sldId id="261" r:id="rId12"/>
-    <p:sldId id="262" r:id="rId13"/>
-    <p:sldId id="263" r:id="rId14"/>
-    <p:sldId id="264" r:id="rId15"/>
-    <p:sldId id="265" r:id="rId16"/>
-    <p:sldId id="266" r:id="rId17"/>
-    <p:sldId id="267" r:id="rId18"/>
-    <p:sldId id="268" r:id="rId19"/>
-    <p:sldId id="269" r:id="rId20"/>
-    <p:sldId id="270" r:id="rId21"/>
-    <p:sldId id="271" r:id="rId22"/>
+    <p:sldId id="256" r:id="rId6"/>
+    <p:sldId id="257" r:id="rId7"/>
+    <p:sldId id="258" r:id="rId8"/>
+    <p:sldId id="259" r:id="rId9"/>
+    <p:sldId id="260" r:id="rId10"/>
+    <p:sldId id="261" r:id="rId11"/>
+    <p:sldId id="262" r:id="rId12"/>
+    <p:sldId id="263" r:id="rId13"/>
+    <p:sldId id="264" r:id="rId14"/>
+    <p:sldId id="265" r:id="rId15"/>
   </p:sldIdLst>
-  <p:sldSz cx="9144000" cy="6858000" type="screen4x3"/>
+  <p:sldSz cx="12192000" cy="6858000"/>
   <p:notesSz cx="6858000" cy="9144000"/>
   <p:defaultTextStyle>
     <a:defPPr>
@@ -119,6 +113,11 @@
       </a:defRPr>
     </a:lvl9pPr>
   </p:defaultTextStyle>
+  <p:extLst>
+    <p:ext uri="{EFAFB233-063F-42B5-8137-9DF3F51BA10A}">
+      <p15:sldGuideLst xmlns:p15="http://schemas.microsoft.com/office/powerpoint/2012/main"/>
+    </p:ext>
+  </p:extLst>
 </p:presentation>
 </file>
 
@@ -151,19 +150,25 @@
         </p:nvSpPr>
         <p:spPr>
           <a:xfrm>
-            <a:off x="685800" y="2130425"/>
-            <a:ext cx="7772400" cy="1470025"/>
+            <a:off x="2417779" y="802298"/>
+            <a:ext cx="8637073" cy="2541431"/>
           </a:xfrm>
         </p:spPr>
         <p:txBody>
-          <a:bodyPr/>
-          <a:lstStyle/>
-          <a:p>
-            <a:r>
-              <a:rPr lang="en-US" smtClean="0"/>
+          <a:bodyPr bIns="0" anchor="b">
+            <a:normAutofit/>
+          </a:bodyPr>
+          <a:lstStyle>
+            <a:lvl1pPr algn="l">
+              <a:defRPr sz="6600"/>
+            </a:lvl1pPr>
+          </a:lstStyle>
+          <a:p>
+            <a:r>
+              <a:rPr lang="en-US"/>
               <a:t>Click to edit Master title style</a:t>
             </a:r>
-            <a:endParaRPr lang="en-US"/>
+            <a:endParaRPr lang="en-US" dirty="0"/>
           </a:p>
         </p:txBody>
       </p:sp>
@@ -179,110 +184,62 @@
         </p:nvSpPr>
         <p:spPr>
           <a:xfrm>
-            <a:off x="1371600" y="3886200"/>
-            <a:ext cx="6400800" cy="1752600"/>
+            <a:off x="2417780" y="3531204"/>
+            <a:ext cx="8637072" cy="977621"/>
           </a:xfrm>
         </p:spPr>
         <p:txBody>
-          <a:bodyPr/>
+          <a:bodyPr tIns="91440" bIns="91440">
+            <a:normAutofit/>
+          </a:bodyPr>
           <a:lstStyle>
-            <a:lvl1pPr marL="0" indent="0" algn="ctr">
-              <a:buNone/>
-              <a:defRPr>
+            <a:lvl1pPr marL="0" indent="0" algn="l">
+              <a:buNone/>
+              <a:defRPr sz="1800" b="0" cap="all" baseline="0">
                 <a:solidFill>
-                  <a:schemeClr val="tx1">
-                    <a:tint val="75000"/>
-                  </a:schemeClr>
+                  <a:schemeClr val="tx1"/>
                 </a:solidFill>
               </a:defRPr>
             </a:lvl1pPr>
             <a:lvl2pPr marL="457200" indent="0" algn="ctr">
               <a:buNone/>
-              <a:defRPr>
-                <a:solidFill>
-                  <a:schemeClr val="tx1">
-                    <a:tint val="75000"/>
-                  </a:schemeClr>
-                </a:solidFill>
-              </a:defRPr>
+              <a:defRPr sz="1800"/>
             </a:lvl2pPr>
             <a:lvl3pPr marL="914400" indent="0" algn="ctr">
               <a:buNone/>
-              <a:defRPr>
-                <a:solidFill>
-                  <a:schemeClr val="tx1">
-                    <a:tint val="75000"/>
-                  </a:schemeClr>
-                </a:solidFill>
-              </a:defRPr>
+              <a:defRPr sz="1800"/>
             </a:lvl3pPr>
             <a:lvl4pPr marL="1371600" indent="0" algn="ctr">
               <a:buNone/>
-              <a:defRPr>
-                <a:solidFill>
-                  <a:schemeClr val="tx1">
-                    <a:tint val="75000"/>
-                  </a:schemeClr>
-                </a:solidFill>
-              </a:defRPr>
+              <a:defRPr sz="1600"/>
             </a:lvl4pPr>
             <a:lvl5pPr marL="1828800" indent="0" algn="ctr">
               <a:buNone/>
-              <a:defRPr>
-                <a:solidFill>
-                  <a:schemeClr val="tx1">
-                    <a:tint val="75000"/>
-                  </a:schemeClr>
-                </a:solidFill>
-              </a:defRPr>
+              <a:defRPr sz="1600"/>
             </a:lvl5pPr>
             <a:lvl6pPr marL="2286000" indent="0" algn="ctr">
               <a:buNone/>
-              <a:defRPr>
-                <a:solidFill>
-                  <a:schemeClr val="tx1">
-                    <a:tint val="75000"/>
-                  </a:schemeClr>
-                </a:solidFill>
-              </a:defRPr>
+              <a:defRPr sz="1600"/>
             </a:lvl6pPr>
             <a:lvl7pPr marL="2743200" indent="0" algn="ctr">
               <a:buNone/>
-              <a:defRPr>
-                <a:solidFill>
-                  <a:schemeClr val="tx1">
-                    <a:tint val="75000"/>
-                  </a:schemeClr>
-                </a:solidFill>
-              </a:defRPr>
+              <a:defRPr sz="1600"/>
             </a:lvl7pPr>
             <a:lvl8pPr marL="3200400" indent="0" algn="ctr">
               <a:buNone/>
-              <a:defRPr>
-                <a:solidFill>
-                  <a:schemeClr val="tx1">
-                    <a:tint val="75000"/>
-                  </a:schemeClr>
-                </a:solidFill>
-              </a:defRPr>
+              <a:defRPr sz="1600"/>
             </a:lvl8pPr>
             <a:lvl9pPr marL="3657600" indent="0" algn="ctr">
               <a:buNone/>
-              <a:defRPr>
-                <a:solidFill>
-                  <a:schemeClr val="tx1">
-                    <a:tint val="75000"/>
-                  </a:schemeClr>
-                </a:solidFill>
-              </a:defRPr>
+              <a:defRPr sz="1600"/>
             </a:lvl9pPr>
           </a:lstStyle>
           <a:p>
             <a:r>
-              <a:rPr lang="en-US" smtClean="0"/>
+              <a:rPr lang="en-US"/>
               <a:t>Click to edit Master subtitle style</a:t>
             </a:r>
-            <a:endParaRPr lang="en-US"/>
+            <a:endParaRPr lang="en-US" dirty="0"/>
           </a:p>
         </p:txBody>
       </p:sp>
@@ -301,11 +258,11 @@
           <a:bodyPr/>
           <a:lstStyle/>
           <a:p>
-            <a:fld id="{5BCAD085-E8A6-8845-BD4E-CB4CCA059FC4}" type="datetimeFigureOut">
-              <a:rPr lang="en-US" smtClean="0"/>
-              <a:t>1/27/13</a:t>
+            <a:fld id="{A98F60FD-DC1C-204F-8C1F-00DE41EB5C58}" type="datetimeFigureOut">
+              <a:rPr lang="en-AM" smtClean="0"/>
+              <a:t>19.03.24</a:t>
             </a:fld>
-            <a:endParaRPr lang="en-US"/>
+            <a:endParaRPr lang="en-AM"/>
           </a:p>
         </p:txBody>
       </p:sp>
@@ -319,12 +276,17 @@
             <p:ph type="ftr" sz="quarter" idx="11"/>
           </p:nvPr>
         </p:nvSpPr>
-        <p:spPr/>
-        <p:txBody>
-          <a:bodyPr/>
-          <a:lstStyle/>
-          <a:p>
-            <a:endParaRPr lang="en-US"/>
+        <p:spPr>
+          <a:xfrm>
+            <a:off x="2416500" y="329307"/>
+            <a:ext cx="4973915" cy="309201"/>
+          </a:xfrm>
+        </p:spPr>
+        <p:txBody>
+          <a:bodyPr/>
+          <a:lstStyle/>
+          <a:p>
+            <a:endParaRPr lang="en-AM"/>
           </a:p>
         </p:txBody>
       </p:sp>
@@ -338,23 +300,59 @@
             <p:ph type="sldNum" sz="quarter" idx="12"/>
           </p:nvPr>
         </p:nvSpPr>
-        <p:spPr/>
-        <p:txBody>
-          <a:bodyPr/>
-          <a:lstStyle/>
-          <a:p>
-            <a:fld id="{C1FF6DA9-008F-8B48-92A6-B652298478BF}" type="slidenum">
-              <a:rPr lang="en-US" smtClean="0"/>
+        <p:spPr>
+          <a:xfrm>
+            <a:off x="1437664" y="798973"/>
+            <a:ext cx="811019" cy="503578"/>
+          </a:xfrm>
+        </p:spPr>
+        <p:txBody>
+          <a:bodyPr/>
+          <a:lstStyle/>
+          <a:p>
+            <a:fld id="{80B75221-7FF7-5846-8D81-216EBB3FA69A}" type="slidenum">
+              <a:rPr lang="en-AM" smtClean="0"/>
               <a:t>‹#›</a:t>
             </a:fld>
-            <a:endParaRPr lang="en-US"/>
-          </a:p>
-        </p:txBody>
-      </p:sp>
+            <a:endParaRPr lang="en-AM"/>
+          </a:p>
+        </p:txBody>
+      </p:sp>
+      <p:cxnSp>
+        <p:nvCxnSpPr>
+          <p:cNvPr id="15" name="Straight Connector 14"/>
+          <p:cNvCxnSpPr/>
+          <p:nvPr/>
+        </p:nvCxnSpPr>
+        <p:spPr>
+          <a:xfrm>
+            <a:off x="2417780" y="3528542"/>
+            <a:ext cx="8637072" cy="0"/>
+          </a:xfrm>
+          <a:prstGeom prst="line">
+            <a:avLst/>
+          </a:prstGeom>
+          <a:ln w="31750"/>
+        </p:spPr>
+        <p:style>
+          <a:lnRef idx="3">
+            <a:schemeClr val="accent1"/>
+          </a:lnRef>
+          <a:fillRef idx="0">
+            <a:schemeClr val="accent1"/>
+          </a:fillRef>
+          <a:effectRef idx="2">
+            <a:schemeClr val="accent1"/>
+          </a:effectRef>
+          <a:fontRef idx="minor">
+            <a:schemeClr val="tx1"/>
+          </a:fontRef>
+        </p:style>
+      </p:cxnSp>
     </p:spTree>
     <p:extLst>
       <p:ext uri="{BB962C8B-B14F-4D97-AF65-F5344CB8AC3E}">
-        <p14:creationId xmlns:p14="http://schemas.microsoft.com/office/powerpoint/2010/main" val="3168075583"/>
+        <p14:creationId xmlns:p14="http://schemas.microsoft.com/office/powerpoint/2010/main" val="3602499016"/>
       </p:ext>
     </p:extLst>
   </p:cSld>
@@ -397,10 +395,10 @@
           <a:lstStyle/>
           <a:p>
             <a:r>
-              <a:rPr lang="en-US" smtClean="0"/>
+              <a:rPr lang="en-US"/>
               <a:t>Click to edit Master title style</a:t>
             </a:r>
-            <a:endParaRPr lang="en-US"/>
+            <a:endParaRPr lang="en-US" dirty="0"/>
           </a:p>
         </p:txBody>
       </p:sp>
@@ -421,38 +419,38 @@
           <a:p>
             <a:pPr lvl="0"/>
             <a:r>
-              <a:rPr lang="en-US" smtClean="0"/>
+              <a:rPr lang="en-US"/>
               <a:t>Click to edit Master text styles</a:t>
             </a:r>
           </a:p>
           <a:p>
             <a:pPr lvl="1"/>
             <a:r>
-              <a:rPr lang="en-US" smtClean="0"/>
+              <a:rPr lang="en-US"/>
               <a:t>Second level</a:t>
             </a:r>
           </a:p>
           <a:p>
             <a:pPr lvl="2"/>
             <a:r>
-              <a:rPr lang="en-US" smtClean="0"/>
+              <a:rPr lang="en-US"/>
               <a:t>Third level</a:t>
             </a:r>
           </a:p>
           <a:p>
             <a:pPr lvl="3"/>
             <a:r>
-              <a:rPr lang="en-US" smtClean="0"/>
+              <a:rPr lang="en-US"/>
               <a:t>Fourth level</a:t>
             </a:r>
           </a:p>
           <a:p>
             <a:pPr lvl="4"/>
             <a:r>
-              <a:rPr lang="en-US" smtClean="0"/>
+              <a:rPr lang="en-US"/>
               <a:t>Fifth level</a:t>
             </a:r>
-            <a:endParaRPr lang="en-US"/>
+            <a:endParaRPr lang="en-US" dirty="0"/>
           </a:p>
         </p:txBody>
       </p:sp>
@@ -471,11 +469,11 @@
           <a:bodyPr/>
           <a:lstStyle/>
           <a:p>
-            <a:fld id="{5BCAD085-E8A6-8845-BD4E-CB4CCA059FC4}" type="datetimeFigureOut">
-              <a:rPr lang="en-US" smtClean="0"/>
-              <a:t>1/27/13</a:t>
+            <a:fld id="{A98F60FD-DC1C-204F-8C1F-00DE41EB5C58}" type="datetimeFigureOut">
+              <a:rPr lang="en-AM" smtClean="0"/>
+              <a:t>19.03.24</a:t>
             </a:fld>
-            <a:endParaRPr lang="en-US"/>
+            <a:endParaRPr lang="en-AM"/>
           </a:p>
         </p:txBody>
       </p:sp>
@@ -494,7 +492,7 @@
           <a:bodyPr/>
           <a:lstStyle/>
           <a:p>
-            <a:endParaRPr lang="en-US"/>
+            <a:endParaRPr lang="en-AM"/>
           </a:p>
         </p:txBody>
       </p:sp>
@@ -513,18 +511,49 @@
           <a:bodyPr/>
           <a:lstStyle/>
           <a:p>
-            <a:fld id="{C1FF6DA9-008F-8B48-92A6-B652298478BF}" type="slidenum">
-              <a:rPr lang="en-US" smtClean="0"/>
+            <a:fld id="{80B75221-7FF7-5846-8D81-216EBB3FA69A}" type="slidenum">
+              <a:rPr lang="en-AM" smtClean="0"/>
               <a:t>‹#›</a:t>
             </a:fld>
-            <a:endParaRPr lang="en-US"/>
-          </a:p>
-        </p:txBody>
-      </p:sp>
+            <a:endParaRPr lang="en-AM"/>
+          </a:p>
+        </p:txBody>
+      </p:sp>
+      <p:cxnSp>
+        <p:nvCxnSpPr>
+          <p:cNvPr id="26" name="Straight Connector 25"/>
+          <p:cNvCxnSpPr/>
+          <p:nvPr/>
+        </p:nvCxnSpPr>
+        <p:spPr>
+          <a:xfrm>
+            <a:off x="1453896" y="1847088"/>
+            <a:ext cx="9607522" cy="0"/>
+          </a:xfrm>
+          <a:prstGeom prst="line">
+            <a:avLst/>
+          </a:prstGeom>
+          <a:ln w="31750"/>
+        </p:spPr>
+        <p:style>
+          <a:lnRef idx="3">
+            <a:schemeClr val="accent1"/>
+          </a:lnRef>
+          <a:fillRef idx="0">
+            <a:schemeClr val="accent1"/>
+          </a:fillRef>
+          <a:effectRef idx="2">
+            <a:schemeClr val="accent1"/>
+          </a:effectRef>
+          <a:fontRef idx="minor">
+            <a:schemeClr val="tx1"/>
+          </a:fontRef>
+        </p:style>
+      </p:cxnSp>
     </p:spTree>
     <p:extLst>
       <p:ext uri="{BB962C8B-B14F-4D97-AF65-F5344CB8AC3E}">
-        <p14:creationId xmlns:p14="http://schemas.microsoft.com/office/powerpoint/2010/main" val="2910927964"/>
+        <p14:creationId xmlns:p14="http://schemas.microsoft.com/office/powerpoint/2010/main" val="1003740630"/>
       </p:ext>
     </p:extLst>
   </p:cSld>
@@ -563,19 +592,23 @@
         </p:nvSpPr>
         <p:spPr>
           <a:xfrm>
-            <a:off x="6629400" y="274638"/>
-            <a:ext cx="2057400" cy="5851525"/>
+            <a:off x="9439111" y="798973"/>
+            <a:ext cx="1615742" cy="4659889"/>
           </a:xfrm>
         </p:spPr>
         <p:txBody>
           <a:bodyPr vert="eaVert"/>
-          <a:lstStyle/>
-          <a:p>
-            <a:r>
-              <a:rPr lang="en-US" smtClean="0"/>
+          <a:lstStyle>
+            <a:lvl1pPr algn="l">
+              <a:defRPr/>
+            </a:lvl1pPr>
+          </a:lstStyle>
+          <a:p>
+            <a:r>
+              <a:rPr lang="en-US"/>
               <a:t>Click to edit Master title style</a:t>
             </a:r>
-            <a:endParaRPr lang="en-US"/>
+            <a:endParaRPr lang="en-US" dirty="0"/>
           </a:p>
         </p:txBody>
       </p:sp>
@@ -591,8 +624,8 @@
         </p:nvSpPr>
         <p:spPr>
           <a:xfrm>
-            <a:off x="457200" y="274638"/>
-            <a:ext cx="6019800" cy="5851525"/>
+            <a:off x="1444672" y="798973"/>
+            <a:ext cx="7828830" cy="4659889"/>
           </a:xfrm>
         </p:spPr>
         <p:txBody>
@@ -601,38 +634,38 @@
           <a:p>
             <a:pPr lvl="0"/>
             <a:r>
-              <a:rPr lang="en-US" smtClean="0"/>
+              <a:rPr lang="en-US"/>
               <a:t>Click to edit Master text styles</a:t>
             </a:r>
           </a:p>
           <a:p>
             <a:pPr lvl="1"/>
             <a:r>
-              <a:rPr lang="en-US" smtClean="0"/>
+              <a:rPr lang="en-US"/>
               <a:t>Second level</a:t>
             </a:r>
           </a:p>
           <a:p>
             <a:pPr lvl="2"/>
             <a:r>
-              <a:rPr lang="en-US" smtClean="0"/>
+              <a:rPr lang="en-US"/>
               <a:t>Third level</a:t>
             </a:r>
           </a:p>
           <a:p>
             <a:pPr lvl="3"/>
             <a:r>
-              <a:rPr lang="en-US" smtClean="0"/>
+              <a:rPr lang="en-US"/>
               <a:t>Fourth level</a:t>
             </a:r>
           </a:p>
           <a:p>
             <a:pPr lvl="4"/>
             <a:r>
-              <a:rPr lang="en-US" smtClean="0"/>
+              <a:rPr lang="en-US"/>
               <a:t>Fifth level</a:t>
             </a:r>
-            <a:endParaRPr lang="en-US"/>
+            <a:endParaRPr lang="en-US" dirty="0"/>
           </a:p>
         </p:txBody>
       </p:sp>
@@ -651,11 +684,11 @@
           <a:bodyPr/>
           <a:lstStyle/>
           <a:p>
-            <a:fld id="{5BCAD085-E8A6-8845-BD4E-CB4CCA059FC4}" type="datetimeFigureOut">
-              <a:rPr lang="en-US" smtClean="0"/>
-              <a:t>1/27/13</a:t>
+            <a:fld id="{A98F60FD-DC1C-204F-8C1F-00DE41EB5C58}" type="datetimeFigureOut">
+              <a:rPr lang="en-AM" smtClean="0"/>
+              <a:t>19.03.24</a:t>
             </a:fld>
-            <a:endParaRPr lang="en-US"/>
+            <a:endParaRPr lang="en-AM"/>
           </a:p>
         </p:txBody>
       </p:sp>
@@ -674,7 +707,7 @@
           <a:bodyPr/>
           <a:lstStyle/>
           <a:p>
-            <a:endParaRPr lang="en-US"/>
+            <a:endParaRPr lang="en-AM"/>
           </a:p>
         </p:txBody>
       </p:sp>
@@ -693,18 +726,49 @@
           <a:bodyPr/>
           <a:lstStyle/>
           <a:p>
-            <a:fld id="{C1FF6DA9-008F-8B48-92A6-B652298478BF}" type="slidenum">
-              <a:rPr lang="en-US" smtClean="0"/>
+            <a:fld id="{80B75221-7FF7-5846-8D81-216EBB3FA69A}" type="slidenum">
+              <a:rPr lang="en-AM" smtClean="0"/>
               <a:t>‹#›</a:t>
             </a:fld>
-            <a:endParaRPr lang="en-US"/>
-          </a:p>
-        </p:txBody>
-      </p:sp>
+            <a:endParaRPr lang="en-AM"/>
+          </a:p>
+        </p:txBody>
+      </p:sp>
+      <p:cxnSp>
+        <p:nvCxnSpPr>
+          <p:cNvPr id="15" name="Straight Connector 14"/>
+          <p:cNvCxnSpPr/>
+          <p:nvPr/>
+        </p:nvCxnSpPr>
+        <p:spPr>
+          <a:xfrm>
+            <a:off x="9439111" y="798973"/>
+            <a:ext cx="0" cy="4659889"/>
+          </a:xfrm>
+          <a:prstGeom prst="line">
+            <a:avLst/>
+          </a:prstGeom>
+          <a:ln w="31750"/>
+        </p:spPr>
+        <p:style>
+          <a:lnRef idx="3">
+            <a:schemeClr val="accent1"/>
+          </a:lnRef>
+          <a:fillRef idx="0">
+            <a:schemeClr val="accent1"/>
+          </a:fillRef>
+          <a:effectRef idx="2">
+            <a:schemeClr val="accent1"/>
+          </a:effectRef>
+          <a:fontRef idx="minor">
+            <a:schemeClr val="tx1"/>
+          </a:fontRef>
+        </p:style>
+      </p:cxnSp>
     </p:spTree>
     <p:extLst>
       <p:ext uri="{BB962C8B-B14F-4D97-AF65-F5344CB8AC3E}">
-        <p14:creationId xmlns:p14="http://schemas.microsoft.com/office/powerpoint/2010/main" val="3612223792"/>
+        <p14:creationId xmlns:p14="http://schemas.microsoft.com/office/powerpoint/2010/main" val="2127836802"/>
       </p:ext>
     </p:extLst>
   </p:cSld>
@@ -747,10 +811,10 @@
           <a:lstStyle/>
           <a:p>
             <a:r>
-              <a:rPr lang="en-US" smtClean="0"/>
+              <a:rPr lang="en-US"/>
               <a:t>Click to edit Master title style</a:t>
             </a:r>
-            <a:endParaRPr lang="en-US"/>
+            <a:endParaRPr lang="en-US" dirty="0"/>
           </a:p>
         </p:txBody>
       </p:sp>
@@ -766,43 +830,43 @@
         </p:nvSpPr>
         <p:spPr/>
         <p:txBody>
-          <a:bodyPr/>
+          <a:bodyPr anchor="t"/>
           <a:lstStyle/>
           <a:p>
             <a:pPr lvl="0"/>
             <a:r>
-              <a:rPr lang="en-US" smtClean="0"/>
+              <a:rPr lang="en-US"/>
               <a:t>Click to edit Master text styles</a:t>
             </a:r>
           </a:p>
           <a:p>
             <a:pPr lvl="1"/>
             <a:r>
-              <a:rPr lang="en-US" smtClean="0"/>
+              <a:rPr lang="en-US"/>
               <a:t>Second level</a:t>
             </a:r>
           </a:p>
           <a:p>
             <a:pPr lvl="2"/>
             <a:r>
-              <a:rPr lang="en-US" smtClean="0"/>
+              <a:rPr lang="en-US"/>
               <a:t>Third level</a:t>
             </a:r>
           </a:p>
           <a:p>
             <a:pPr lvl="3"/>
             <a:r>
-              <a:rPr lang="en-US" smtClean="0"/>
+              <a:rPr lang="en-US"/>
               <a:t>Fourth level</a:t>
             </a:r>
           </a:p>
           <a:p>
             <a:pPr lvl="4"/>
             <a:r>
-              <a:rPr lang="en-US" smtClean="0"/>
+              <a:rPr lang="en-US"/>
               <a:t>Fifth level</a:t>
             </a:r>
-            <a:endParaRPr lang="en-US"/>
+            <a:endParaRPr lang="en-US" dirty="0"/>
           </a:p>
         </p:txBody>
       </p:sp>
@@ -821,11 +885,11 @@
           <a:bodyPr/>
           <a:lstStyle/>
           <a:p>
-            <a:fld id="{5BCAD085-E8A6-8845-BD4E-CB4CCA059FC4}" type="datetimeFigureOut">
-              <a:rPr lang="en-US" smtClean="0"/>
-              <a:t>1/27/13</a:t>
+            <a:fld id="{A98F60FD-DC1C-204F-8C1F-00DE41EB5C58}" type="datetimeFigureOut">
+              <a:rPr lang="en-AM" smtClean="0"/>
+              <a:t>19.03.24</a:t>
             </a:fld>
-            <a:endParaRPr lang="en-US"/>
+            <a:endParaRPr lang="en-AM"/>
           </a:p>
         </p:txBody>
       </p:sp>
@@ -844,7 +908,7 @@
           <a:bodyPr/>
           <a:lstStyle/>
           <a:p>
-            <a:endParaRPr lang="en-US"/>
+            <a:endParaRPr lang="en-AM"/>
           </a:p>
         </p:txBody>
       </p:sp>
@@ -863,18 +927,49 @@
           <a:bodyPr/>
           <a:lstStyle/>
           <a:p>
-            <a:fld id="{C1FF6DA9-008F-8B48-92A6-B652298478BF}" type="slidenum">
-              <a:rPr lang="en-US" smtClean="0"/>
+            <a:fld id="{80B75221-7FF7-5846-8D81-216EBB3FA69A}" type="slidenum">
+              <a:rPr lang="en-AM" smtClean="0"/>
               <a:t>‹#›</a:t>
             </a:fld>
-            <a:endParaRPr lang="en-US"/>
-          </a:p>
-        </p:txBody>
-      </p:sp>
+            <a:endParaRPr lang="en-AM"/>
+          </a:p>
+        </p:txBody>
+      </p:sp>
+      <p:cxnSp>
+        <p:nvCxnSpPr>
+          <p:cNvPr id="33" name="Straight Connector 32"/>
+          <p:cNvCxnSpPr/>
+          <p:nvPr/>
+        </p:nvCxnSpPr>
+        <p:spPr>
+          <a:xfrm>
+            <a:off x="1453896" y="1847088"/>
+            <a:ext cx="9607522" cy="0"/>
+          </a:xfrm>
+          <a:prstGeom prst="line">
+            <a:avLst/>
+          </a:prstGeom>
+          <a:ln w="31750"/>
+        </p:spPr>
+        <p:style>
+          <a:lnRef idx="3">
+            <a:schemeClr val="accent1"/>
+          </a:lnRef>
+          <a:fillRef idx="0">
+            <a:schemeClr val="accent1"/>
+          </a:fillRef>
+          <a:effectRef idx="2">
+            <a:schemeClr val="accent1"/>
+          </a:effectRef>
+          <a:fontRef idx="minor">
+            <a:schemeClr val="tx1"/>
+          </a:fontRef>
+        </p:style>
+      </p:cxnSp>
     </p:spTree>
     <p:extLst>
       <p:ext uri="{BB962C8B-B14F-4D97-AF65-F5344CB8AC3E}">
-        <p14:creationId xmlns:p14="http://schemas.microsoft.com/office/powerpoint/2010/main" val="2614314258"/>
+        <p14:creationId xmlns:p14="http://schemas.microsoft.com/office/powerpoint/2010/main" val="862244763"/>
       </p:ext>
     </p:extLst>
   </p:cSld>
@@ -913,23 +1008,25 @@
         </p:nvSpPr>
         <p:spPr>
           <a:xfrm>
-            <a:off x="722313" y="4406900"/>
-            <a:ext cx="7772400" cy="1362075"/>
+            <a:off x="1454239" y="1756130"/>
+            <a:ext cx="8643154" cy="1887950"/>
           </a:xfrm>
         </p:spPr>
         <p:txBody>
-          <a:bodyPr anchor="t"/>
+          <a:bodyPr anchor="b">
+            <a:normAutofit/>
+          </a:bodyPr>
           <a:lstStyle>
             <a:lvl1pPr algn="l">
-              <a:defRPr sz="4000" b="1" cap="all"/>
+              <a:defRPr sz="3600"/>
             </a:lvl1pPr>
           </a:lstStyle>
           <a:p>
             <a:r>
-              <a:rPr lang="en-US" smtClean="0"/>
+              <a:rPr lang="en-US"/>
               <a:t>Click to edit Master title style</a:t>
             </a:r>
-            <a:endParaRPr lang="en-US"/>
+            <a:endParaRPr lang="en-US" dirty="0"/>
           </a:p>
         </p:txBody>
       </p:sp>
@@ -945,20 +1042,20 @@
         </p:nvSpPr>
         <p:spPr>
           <a:xfrm>
-            <a:off x="722313" y="2906713"/>
-            <a:ext cx="7772400" cy="1500187"/>
+            <a:off x="1454239" y="3806195"/>
+            <a:ext cx="8630446" cy="1012929"/>
           </a:xfrm>
         </p:spPr>
         <p:txBody>
-          <a:bodyPr anchor="b"/>
+          <a:bodyPr tIns="91440">
+            <a:normAutofit/>
+          </a:bodyPr>
           <a:lstStyle>
-            <a:lvl1pPr marL="0" indent="0">
-              <a:buNone/>
-              <a:defRPr sz="2000">
+            <a:lvl1pPr marL="0" indent="0" algn="l">
+              <a:buNone/>
+              <a:defRPr sz="1800">
                 <a:solidFill>
-                  <a:schemeClr val="tx1">
-                    <a:tint val="75000"/>
-                  </a:schemeClr>
+                  <a:schemeClr val="tx1"/>
                 </a:solidFill>
               </a:defRPr>
             </a:lvl1pPr>
@@ -974,7 +1071,7 @@
             </a:lvl2pPr>
             <a:lvl3pPr marL="914400" indent="0">
               <a:buNone/>
-              <a:defRPr sz="1600">
+              <a:defRPr sz="1800">
                 <a:solidFill>
                   <a:schemeClr val="tx1">
                     <a:tint val="75000"/>
@@ -984,7 +1081,7 @@
             </a:lvl3pPr>
             <a:lvl4pPr marL="1371600" indent="0">
               <a:buNone/>
-              <a:defRPr sz="1400">
+              <a:defRPr sz="1600">
                 <a:solidFill>
                   <a:schemeClr val="tx1">
                     <a:tint val="75000"/>
@@ -994,7 +1091,7 @@
             </a:lvl4pPr>
             <a:lvl5pPr marL="1828800" indent="0">
               <a:buNone/>
-              <a:defRPr sz="1400">
+              <a:defRPr sz="1600">
                 <a:solidFill>
                   <a:schemeClr val="tx1">
                     <a:tint val="75000"/>
@@ -1004,7 +1101,7 @@
             </a:lvl5pPr>
             <a:lvl6pPr marL="2286000" indent="0">
               <a:buNone/>
-              <a:defRPr sz="1400">
+              <a:defRPr sz="1600">
                 <a:solidFill>
                   <a:schemeClr val="tx1">
                     <a:tint val="75000"/>
@@ -1014,7 +1111,7 @@
             </a:lvl6pPr>
             <a:lvl7pPr marL="2743200" indent="0">
               <a:buNone/>
-              <a:defRPr sz="1400">
+              <a:defRPr sz="1600">
                 <a:solidFill>
                   <a:schemeClr val="tx1">
                     <a:tint val="75000"/>
@@ -1024,7 +1121,7 @@
             </a:lvl7pPr>
             <a:lvl8pPr marL="3200400" indent="0">
               <a:buNone/>
-              <a:defRPr sz="1400">
+              <a:defRPr sz="1600">
                 <a:solidFill>
                   <a:schemeClr val="tx1">
                     <a:tint val="75000"/>
@@ -1034,7 +1131,7 @@
             </a:lvl8pPr>
             <a:lvl9pPr marL="3657600" indent="0">
               <a:buNone/>
-              <a:defRPr sz="1400">
+              <a:defRPr sz="1600">
                 <a:solidFill>
                   <a:schemeClr val="tx1">
                     <a:tint val="75000"/>
@@ -1046,7 +1143,7 @@
           <a:p>
             <a:pPr lvl="0"/>
             <a:r>
-              <a:rPr lang="en-US" smtClean="0"/>
+              <a:rPr lang="en-US"/>
               <a:t>Click to edit Master text styles</a:t>
             </a:r>
           </a:p>
@@ -1067,11 +1164,11 @@
           <a:bodyPr/>
           <a:lstStyle/>
           <a:p>
-            <a:fld id="{5BCAD085-E8A6-8845-BD4E-CB4CCA059FC4}" type="datetimeFigureOut">
-              <a:rPr lang="en-US" smtClean="0"/>
-              <a:t>1/27/13</a:t>
+            <a:fld id="{A98F60FD-DC1C-204F-8C1F-00DE41EB5C58}" type="datetimeFigureOut">
+              <a:rPr lang="en-AM" smtClean="0"/>
+              <a:t>19.03.24</a:t>
             </a:fld>
-            <a:endParaRPr lang="en-US"/>
+            <a:endParaRPr lang="en-AM"/>
           </a:p>
         </p:txBody>
       </p:sp>
@@ -1090,7 +1187,7 @@
           <a:bodyPr/>
           <a:lstStyle/>
           <a:p>
-            <a:endParaRPr lang="en-US"/>
+            <a:endParaRPr lang="en-AM"/>
           </a:p>
         </p:txBody>
       </p:sp>
@@ -1109,18 +1206,49 @@
           <a:bodyPr/>
           <a:lstStyle/>
           <a:p>
-            <a:fld id="{C1FF6DA9-008F-8B48-92A6-B652298478BF}" type="slidenum">
-              <a:rPr lang="en-US" smtClean="0"/>
+            <a:fld id="{80B75221-7FF7-5846-8D81-216EBB3FA69A}" type="slidenum">
+              <a:rPr lang="en-AM" smtClean="0"/>
               <a:t>‹#›</a:t>
             </a:fld>
-            <a:endParaRPr lang="en-US"/>
-          </a:p>
-        </p:txBody>
-      </p:sp>
+            <a:endParaRPr lang="en-AM"/>
+          </a:p>
+        </p:txBody>
+      </p:sp>
+      <p:cxnSp>
+        <p:nvCxnSpPr>
+          <p:cNvPr id="15" name="Straight Connector 14"/>
+          <p:cNvCxnSpPr/>
+          <p:nvPr/>
+        </p:nvCxnSpPr>
+        <p:spPr>
+          <a:xfrm>
+            <a:off x="1454239" y="3804985"/>
+            <a:ext cx="8630446" cy="0"/>
+          </a:xfrm>
+          <a:prstGeom prst="line">
+            <a:avLst/>
+          </a:prstGeom>
+          <a:ln w="31750"/>
+        </p:spPr>
+        <p:style>
+          <a:lnRef idx="3">
+            <a:schemeClr val="accent1"/>
+          </a:lnRef>
+          <a:fillRef idx="0">
+            <a:schemeClr val="accent1"/>
+          </a:fillRef>
+          <a:effectRef idx="2">
+            <a:schemeClr val="accent1"/>
+          </a:effectRef>
+          <a:fontRef idx="minor">
+            <a:schemeClr val="tx1"/>
+          </a:fontRef>
+        </p:style>
+      </p:cxnSp>
     </p:spTree>
     <p:extLst>
       <p:ext uri="{BB962C8B-B14F-4D97-AF65-F5344CB8AC3E}">
-        <p14:creationId xmlns:p14="http://schemas.microsoft.com/office/powerpoint/2010/main" val="960648375"/>
+        <p14:creationId xmlns:p14="http://schemas.microsoft.com/office/powerpoint/2010/main" val="1801554767"/>
       </p:ext>
     </p:extLst>
   </p:cSld>
@@ -1157,186 +1285,135 @@
             <p:ph type="title"/>
           </p:nvPr>
         </p:nvSpPr>
-        <p:spPr/>
-        <p:txBody>
-          <a:bodyPr/>
-          <a:lstStyle/>
-          <a:p>
-            <a:r>
-              <a:rPr lang="en-US" smtClean="0"/>
-              <a:t>Click to edit Master title style</a:t>
-            </a:r>
-            <a:endParaRPr lang="en-US"/>
-          </a:p>
-        </p:txBody>
-      </p:sp>
-      <p:sp>
-        <p:nvSpPr>
-          <p:cNvPr id="3" name="Content Placeholder 2"/>
-          <p:cNvSpPr>
-            <a:spLocks noGrp="1"/>
-          </p:cNvSpPr>
-          <p:nvPr>
-            <p:ph sz="half" idx="1"/>
-          </p:nvPr>
-        </p:nvSpPr>
         <p:spPr>
           <a:xfrm>
-            <a:off x="457200" y="1600200"/>
-            <a:ext cx="4038600" cy="4525963"/>
+            <a:off x="1449217" y="804889"/>
+            <a:ext cx="9605635" cy="1059305"/>
           </a:xfrm>
         </p:spPr>
         <p:txBody>
           <a:bodyPr/>
-          <a:lstStyle>
-            <a:lvl1pPr>
-              <a:defRPr sz="2800"/>
-            </a:lvl1pPr>
-            <a:lvl2pPr>
-              <a:defRPr sz="2400"/>
-            </a:lvl2pPr>
-            <a:lvl3pPr>
-              <a:defRPr sz="2000"/>
-            </a:lvl3pPr>
-            <a:lvl4pPr>
-              <a:defRPr sz="1800"/>
-            </a:lvl4pPr>
-            <a:lvl5pPr>
-              <a:defRPr sz="1800"/>
-            </a:lvl5pPr>
-            <a:lvl6pPr>
-              <a:defRPr sz="1800"/>
-            </a:lvl6pPr>
-            <a:lvl7pPr>
-              <a:defRPr sz="1800"/>
-            </a:lvl7pPr>
-            <a:lvl8pPr>
-              <a:defRPr sz="1800"/>
-            </a:lvl8pPr>
-            <a:lvl9pPr>
-              <a:defRPr sz="1800"/>
-            </a:lvl9pPr>
-          </a:lstStyle>
-          <a:p>
-            <a:pPr lvl="0"/>
-            <a:r>
-              <a:rPr lang="en-US" smtClean="0"/>
-              <a:t>Click to edit Master text styles</a:t>
-            </a:r>
-          </a:p>
-          <a:p>
-            <a:pPr lvl="1"/>
-            <a:r>
-              <a:rPr lang="en-US" smtClean="0"/>
-              <a:t>Second level</a:t>
-            </a:r>
-          </a:p>
-          <a:p>
-            <a:pPr lvl="2"/>
-            <a:r>
-              <a:rPr lang="en-US" smtClean="0"/>
-              <a:t>Third level</a:t>
-            </a:r>
-          </a:p>
-          <a:p>
-            <a:pPr lvl="3"/>
-            <a:r>
-              <a:rPr lang="en-US" smtClean="0"/>
-              <a:t>Fourth level</a:t>
-            </a:r>
-          </a:p>
-          <a:p>
-            <a:pPr lvl="4"/>
-            <a:r>
-              <a:rPr lang="en-US" smtClean="0"/>
-              <a:t>Fifth level</a:t>
-            </a:r>
-            <a:endParaRPr lang="en-US"/>
-          </a:p>
-        </p:txBody>
-      </p:sp>
-      <p:sp>
-        <p:nvSpPr>
-          <p:cNvPr id="4" name="Content Placeholder 3"/>
-          <p:cNvSpPr>
-            <a:spLocks noGrp="1"/>
-          </p:cNvSpPr>
-          <p:nvPr>
-            <p:ph sz="half" idx="2"/>
+          <a:lstStyle/>
+          <a:p>
+            <a:r>
+              <a:rPr lang="en-US"/>
+              <a:t>Click to edit Master title style</a:t>
+            </a:r>
+            <a:endParaRPr lang="en-US" dirty="0"/>
+          </a:p>
+        </p:txBody>
+      </p:sp>
+      <p:sp>
+        <p:nvSpPr>
+          <p:cNvPr id="3" name="Content Placeholder 2"/>
+          <p:cNvSpPr>
+            <a:spLocks noGrp="1"/>
+          </p:cNvSpPr>
+          <p:nvPr>
+            <p:ph sz="half" idx="1"/>
           </p:nvPr>
         </p:nvSpPr>
         <p:spPr>
           <a:xfrm>
-            <a:off x="4648200" y="1600200"/>
-            <a:ext cx="4038600" cy="4525963"/>
+            <a:off x="1447331" y="2010878"/>
+            <a:ext cx="4645152" cy="3448595"/>
           </a:xfrm>
         </p:spPr>
         <p:txBody>
           <a:bodyPr/>
-          <a:lstStyle>
-            <a:lvl1pPr>
-              <a:defRPr sz="2800"/>
-            </a:lvl1pPr>
-            <a:lvl2pPr>
-              <a:defRPr sz="2400"/>
-            </a:lvl2pPr>
-            <a:lvl3pPr>
-              <a:defRPr sz="2000"/>
-            </a:lvl3pPr>
-            <a:lvl4pPr>
-              <a:defRPr sz="1800"/>
-            </a:lvl4pPr>
-            <a:lvl5pPr>
-              <a:defRPr sz="1800"/>
-            </a:lvl5pPr>
-            <a:lvl6pPr>
-              <a:defRPr sz="1800"/>
-            </a:lvl6pPr>
-            <a:lvl7pPr>
-              <a:defRPr sz="1800"/>
-            </a:lvl7pPr>
-            <a:lvl8pPr>
-              <a:defRPr sz="1800"/>
-            </a:lvl8pPr>
-            <a:lvl9pPr>
-              <a:defRPr sz="1800"/>
-            </a:lvl9pPr>
-          </a:lstStyle>
+          <a:lstStyle/>
           <a:p>
             <a:pPr lvl="0"/>
             <a:r>
-              <a:rPr lang="en-US" smtClean="0"/>
+              <a:rPr lang="en-US"/>
               <a:t>Click to edit Master text styles</a:t>
             </a:r>
           </a:p>
           <a:p>
             <a:pPr lvl="1"/>
             <a:r>
-              <a:rPr lang="en-US" smtClean="0"/>
+              <a:rPr lang="en-US"/>
               <a:t>Second level</a:t>
             </a:r>
           </a:p>
           <a:p>
             <a:pPr lvl="2"/>
             <a:r>
-              <a:rPr lang="en-US" smtClean="0"/>
+              <a:rPr lang="en-US"/>
               <a:t>Third level</a:t>
             </a:r>
           </a:p>
           <a:p>
             <a:pPr lvl="3"/>
             <a:r>
-              <a:rPr lang="en-US" smtClean="0"/>
+              <a:rPr lang="en-US"/>
               <a:t>Fourth level</a:t>
             </a:r>
           </a:p>
           <a:p>
             <a:pPr lvl="4"/>
             <a:r>
-              <a:rPr lang="en-US" smtClean="0"/>
+              <a:rPr lang="en-US"/>
               <a:t>Fifth level</a:t>
             </a:r>
-            <a:endParaRPr lang="en-US"/>
+            <a:endParaRPr lang="en-US" dirty="0"/>
+          </a:p>
+        </p:txBody>
+      </p:sp>
+      <p:sp>
+        <p:nvSpPr>
+          <p:cNvPr id="4" name="Content Placeholder 3"/>
+          <p:cNvSpPr>
+            <a:spLocks noGrp="1"/>
+          </p:cNvSpPr>
+          <p:nvPr>
+            <p:ph sz="half" idx="2"/>
+          </p:nvPr>
+        </p:nvSpPr>
+        <p:spPr>
+          <a:xfrm>
+            <a:off x="6413771" y="2017343"/>
+            <a:ext cx="4645152" cy="3441520"/>
+          </a:xfrm>
+        </p:spPr>
+        <p:txBody>
+          <a:bodyPr/>
+          <a:lstStyle/>
+          <a:p>
+            <a:pPr lvl="0"/>
+            <a:r>
+              <a:rPr lang="en-US"/>
+              <a:t>Click to edit Master text styles</a:t>
+            </a:r>
+          </a:p>
+          <a:p>
+            <a:pPr lvl="1"/>
+            <a:r>
+              <a:rPr lang="en-US"/>
+              <a:t>Second level</a:t>
+            </a:r>
+          </a:p>
+          <a:p>
+            <a:pPr lvl="2"/>
+            <a:r>
+              <a:rPr lang="en-US"/>
+              <a:t>Third level</a:t>
+            </a:r>
+          </a:p>
+          <a:p>
+            <a:pPr lvl="3"/>
+            <a:r>
+              <a:rPr lang="en-US"/>
+              <a:t>Fourth level</a:t>
+            </a:r>
+          </a:p>
+          <a:p>
+            <a:pPr lvl="4"/>
+            <a:r>
+              <a:rPr lang="en-US"/>
+              <a:t>Fifth level</a:t>
+            </a:r>
+            <a:endParaRPr lang="en-US" dirty="0"/>
           </a:p>
         </p:txBody>
       </p:sp>
@@ -1355,11 +1432,11 @@
           <a:bodyPr/>
           <a:lstStyle/>
           <a:p>
-            <a:fld id="{5BCAD085-E8A6-8845-BD4E-CB4CCA059FC4}" type="datetimeFigureOut">
-              <a:rPr lang="en-US" smtClean="0"/>
-              <a:t>1/27/13</a:t>
+            <a:fld id="{A98F60FD-DC1C-204F-8C1F-00DE41EB5C58}" type="datetimeFigureOut">
+              <a:rPr lang="en-AM" smtClean="0"/>
+              <a:t>19.03.24</a:t>
             </a:fld>
-            <a:endParaRPr lang="en-US"/>
+            <a:endParaRPr lang="en-AM"/>
           </a:p>
         </p:txBody>
       </p:sp>
@@ -1378,7 +1455,7 @@
           <a:bodyPr/>
           <a:lstStyle/>
           <a:p>
-            <a:endParaRPr lang="en-US"/>
+            <a:endParaRPr lang="en-AM"/>
           </a:p>
         </p:txBody>
       </p:sp>
@@ -1397,18 +1474,49 @@
           <a:bodyPr/>
           <a:lstStyle/>
           <a:p>
-            <a:fld id="{C1FF6DA9-008F-8B48-92A6-B652298478BF}" type="slidenum">
-              <a:rPr lang="en-US" smtClean="0"/>
+            <a:fld id="{80B75221-7FF7-5846-8D81-216EBB3FA69A}" type="slidenum">
+              <a:rPr lang="en-AM" smtClean="0"/>
               <a:t>‹#›</a:t>
             </a:fld>
-            <a:endParaRPr lang="en-US"/>
-          </a:p>
-        </p:txBody>
-      </p:sp>
+            <a:endParaRPr lang="en-AM"/>
+          </a:p>
+        </p:txBody>
+      </p:sp>
+      <p:cxnSp>
+        <p:nvCxnSpPr>
+          <p:cNvPr id="35" name="Straight Connector 34"/>
+          <p:cNvCxnSpPr/>
+          <p:nvPr/>
+        </p:nvCxnSpPr>
+        <p:spPr>
+          <a:xfrm>
+            <a:off x="1453896" y="1847088"/>
+            <a:ext cx="9607522" cy="0"/>
+          </a:xfrm>
+          <a:prstGeom prst="line">
+            <a:avLst/>
+          </a:prstGeom>
+          <a:ln w="31750"/>
+        </p:spPr>
+        <p:style>
+          <a:lnRef idx="3">
+            <a:schemeClr val="accent1"/>
+          </a:lnRef>
+          <a:fillRef idx="0">
+            <a:schemeClr val="accent1"/>
+          </a:fillRef>
+          <a:effectRef idx="2">
+            <a:schemeClr val="accent1"/>
+          </a:effectRef>
+          <a:fontRef idx="minor">
+            <a:schemeClr val="tx1"/>
+          </a:fontRef>
+        </p:style>
+      </p:cxnSp>
     </p:spTree>
     <p:extLst>
       <p:ext uri="{BB962C8B-B14F-4D97-AF65-F5344CB8AC3E}">
-        <p14:creationId xmlns:p14="http://schemas.microsoft.com/office/powerpoint/2010/main" val="2782244947"/>
+        <p14:creationId xmlns:p14="http://schemas.microsoft.com/office/powerpoint/2010/main" val="2549366655"/>
       </p:ext>
     </p:extLst>
   </p:cSld>
@@ -1445,45 +1553,55 @@
             <p:ph type="title"/>
           </p:nvPr>
         </p:nvSpPr>
-        <p:spPr/>
-        <p:txBody>
-          <a:bodyPr/>
-          <a:lstStyle>
-            <a:lvl1pPr>
-              <a:defRPr/>
-            </a:lvl1pPr>
-          </a:lstStyle>
-          <a:p>
-            <a:r>
-              <a:rPr lang="en-US" smtClean="0"/>
-              <a:t>Click to edit Master title style</a:t>
-            </a:r>
-            <a:endParaRPr lang="en-US"/>
-          </a:p>
-        </p:txBody>
-      </p:sp>
-      <p:sp>
-        <p:nvSpPr>
-          <p:cNvPr id="3" name="Text Placeholder 2"/>
-          <p:cNvSpPr>
-            <a:spLocks noGrp="1"/>
-          </p:cNvSpPr>
-          <p:nvPr>
-            <p:ph type="body" idx="1"/>
-          </p:nvPr>
-        </p:nvSpPr>
         <p:spPr>
           <a:xfrm>
-            <a:off x="457200" y="1535113"/>
-            <a:ext cx="4040188" cy="639762"/>
+            <a:off x="1447191" y="804163"/>
+            <a:ext cx="9607661" cy="1056319"/>
           </a:xfrm>
         </p:spPr>
         <p:txBody>
-          <a:bodyPr anchor="b"/>
+          <a:bodyPr/>
+          <a:lstStyle/>
+          <a:p>
+            <a:r>
+              <a:rPr lang="en-US"/>
+              <a:t>Click to edit Master title style</a:t>
+            </a:r>
+            <a:endParaRPr lang="en-US" dirty="0"/>
+          </a:p>
+        </p:txBody>
+      </p:sp>
+      <p:sp>
+        <p:nvSpPr>
+          <p:cNvPr id="3" name="Text Placeholder 2"/>
+          <p:cNvSpPr>
+            <a:spLocks noGrp="1"/>
+          </p:cNvSpPr>
+          <p:nvPr>
+            <p:ph type="body" idx="1"/>
+          </p:nvPr>
+        </p:nvSpPr>
+        <p:spPr>
+          <a:xfrm>
+            <a:off x="1447191" y="2019549"/>
+            <a:ext cx="4645152" cy="801943"/>
+          </a:xfrm>
+        </p:spPr>
+        <p:txBody>
+          <a:bodyPr anchor="b">
+            <a:normAutofit/>
+          </a:bodyPr>
           <a:lstStyle>
             <a:lvl1pPr marL="0" indent="0">
-              <a:buNone/>
-              <a:defRPr sz="2400" b="1"/>
+              <a:lnSpc>
+                <a:spcPct val="100000"/>
+              </a:lnSpc>
+              <a:buNone/>
+              <a:defRPr sz="2200" b="0" cap="all" baseline="0">
+                <a:solidFill>
+                  <a:schemeClr val="accent1"/>
+                </a:solidFill>
+              </a:defRPr>
             </a:lvl1pPr>
             <a:lvl2pPr marL="457200" indent="0">
               <a:buNone/>
@@ -1521,7 +1639,7 @@
           <a:p>
             <a:pPr lvl="0"/>
             <a:r>
-              <a:rPr lang="en-US" smtClean="0"/>
+              <a:rPr lang="en-US"/>
               <a:t>Click to edit Master text styles</a:t>
             </a:r>
           </a:p>
@@ -1539,76 +1657,48 @@
         </p:nvSpPr>
         <p:spPr>
           <a:xfrm>
-            <a:off x="457200" y="2174875"/>
-            <a:ext cx="4040188" cy="3951288"/>
+            <a:off x="1447191" y="2824269"/>
+            <a:ext cx="4645152" cy="2644457"/>
           </a:xfrm>
         </p:spPr>
         <p:txBody>
           <a:bodyPr/>
-          <a:lstStyle>
-            <a:lvl1pPr>
-              <a:defRPr sz="2400"/>
-            </a:lvl1pPr>
-            <a:lvl2pPr>
-              <a:defRPr sz="2000"/>
-            </a:lvl2pPr>
-            <a:lvl3pPr>
-              <a:defRPr sz="1800"/>
-            </a:lvl3pPr>
-            <a:lvl4pPr>
-              <a:defRPr sz="1600"/>
-            </a:lvl4pPr>
-            <a:lvl5pPr>
-              <a:defRPr sz="1600"/>
-            </a:lvl5pPr>
-            <a:lvl6pPr>
-              <a:defRPr sz="1600"/>
-            </a:lvl6pPr>
-            <a:lvl7pPr>
-              <a:defRPr sz="1600"/>
-            </a:lvl7pPr>
-            <a:lvl8pPr>
-              <a:defRPr sz="1600"/>
-            </a:lvl8pPr>
-            <a:lvl9pPr>
-              <a:defRPr sz="1600"/>
-            </a:lvl9pPr>
-          </a:lstStyle>
+          <a:lstStyle/>
           <a:p>
             <a:pPr lvl="0"/>
             <a:r>
-              <a:rPr lang="en-US" smtClean="0"/>
+              <a:rPr lang="en-US"/>
               <a:t>Click to edit Master text styles</a:t>
             </a:r>
           </a:p>
           <a:p>
             <a:pPr lvl="1"/>
             <a:r>
-              <a:rPr lang="en-US" smtClean="0"/>
+              <a:rPr lang="en-US"/>
               <a:t>Second level</a:t>
             </a:r>
           </a:p>
           <a:p>
             <a:pPr lvl="2"/>
             <a:r>
-              <a:rPr lang="en-US" smtClean="0"/>
+              <a:rPr lang="en-US"/>
               <a:t>Third level</a:t>
             </a:r>
           </a:p>
           <a:p>
             <a:pPr lvl="3"/>
             <a:r>
-              <a:rPr lang="en-US" smtClean="0"/>
+              <a:rPr lang="en-US"/>
               <a:t>Fourth level</a:t>
             </a:r>
           </a:p>
           <a:p>
             <a:pPr lvl="4"/>
             <a:r>
-              <a:rPr lang="en-US" smtClean="0"/>
+              <a:rPr lang="en-US"/>
               <a:t>Fifth level</a:t>
             </a:r>
-            <a:endParaRPr lang="en-US"/>
+            <a:endParaRPr lang="en-US" dirty="0"/>
           </a:p>
         </p:txBody>
       </p:sp>
@@ -1624,16 +1714,25 @@
         </p:nvSpPr>
         <p:spPr>
           <a:xfrm>
-            <a:off x="4645025" y="1535113"/>
-            <a:ext cx="4041775" cy="639762"/>
+            <a:off x="6412362" y="2023003"/>
+            <a:ext cx="4645152" cy="802237"/>
           </a:xfrm>
         </p:spPr>
         <p:txBody>
-          <a:bodyPr anchor="b"/>
+          <a:bodyPr anchor="b">
+            <a:normAutofit/>
+          </a:bodyPr>
           <a:lstStyle>
             <a:lvl1pPr marL="0" indent="0">
-              <a:buNone/>
-              <a:defRPr sz="2400" b="1"/>
+              <a:lnSpc>
+                <a:spcPct val="100000"/>
+              </a:lnSpc>
+              <a:buNone/>
+              <a:defRPr sz="2200" b="0" cap="all" baseline="0">
+                <a:solidFill>
+                  <a:schemeClr val="accent1"/>
+                </a:solidFill>
+              </a:defRPr>
             </a:lvl1pPr>
             <a:lvl2pPr marL="457200" indent="0">
               <a:buNone/>
@@ -1671,7 +1770,7 @@
           <a:p>
             <a:pPr lvl="0"/>
             <a:r>
-              <a:rPr lang="en-US" smtClean="0"/>
+              <a:rPr lang="en-US"/>
               <a:t>Click to edit Master text styles</a:t>
             </a:r>
           </a:p>
@@ -1689,76 +1788,48 @@
         </p:nvSpPr>
         <p:spPr>
           <a:xfrm>
-            <a:off x="4645025" y="2174875"/>
-            <a:ext cx="4041775" cy="3951288"/>
+            <a:off x="6412362" y="2821491"/>
+            <a:ext cx="4645152" cy="2637371"/>
           </a:xfrm>
         </p:spPr>
         <p:txBody>
           <a:bodyPr/>
-          <a:lstStyle>
-            <a:lvl1pPr>
-              <a:defRPr sz="2400"/>
-            </a:lvl1pPr>
-            <a:lvl2pPr>
-              <a:defRPr sz="2000"/>
-            </a:lvl2pPr>
-            <a:lvl3pPr>
-              <a:defRPr sz="1800"/>
-            </a:lvl3pPr>
-            <a:lvl4pPr>
-              <a:defRPr sz="1600"/>
-            </a:lvl4pPr>
-            <a:lvl5pPr>
-              <a:defRPr sz="1600"/>
-            </a:lvl5pPr>
-            <a:lvl6pPr>
-              <a:defRPr sz="1600"/>
-            </a:lvl6pPr>
-            <a:lvl7pPr>
-              <a:defRPr sz="1600"/>
-            </a:lvl7pPr>
-            <a:lvl8pPr>
-              <a:defRPr sz="1600"/>
-            </a:lvl8pPr>
-            <a:lvl9pPr>
-              <a:defRPr sz="1600"/>
-            </a:lvl9pPr>
-          </a:lstStyle>
+          <a:lstStyle/>
           <a:p>
             <a:pPr lvl="0"/>
             <a:r>
-              <a:rPr lang="en-US" smtClean="0"/>
+              <a:rPr lang="en-US"/>
               <a:t>Click to edit Master text styles</a:t>
             </a:r>
           </a:p>
           <a:p>
             <a:pPr lvl="1"/>
             <a:r>
-              <a:rPr lang="en-US" smtClean="0"/>
+              <a:rPr lang="en-US"/>
               <a:t>Second level</a:t>
             </a:r>
           </a:p>
           <a:p>
             <a:pPr lvl="2"/>
             <a:r>
-              <a:rPr lang="en-US" smtClean="0"/>
+              <a:rPr lang="en-US"/>
               <a:t>Third level</a:t>
             </a:r>
           </a:p>
           <a:p>
             <a:pPr lvl="3"/>
             <a:r>
-              <a:rPr lang="en-US" smtClean="0"/>
+              <a:rPr lang="en-US"/>
               <a:t>Fourth level</a:t>
             </a:r>
           </a:p>
           <a:p>
             <a:pPr lvl="4"/>
             <a:r>
-              <a:rPr lang="en-US" smtClean="0"/>
+              <a:rPr lang="en-US"/>
               <a:t>Fifth level</a:t>
             </a:r>
-            <a:endParaRPr lang="en-US"/>
+            <a:endParaRPr lang="en-US" dirty="0"/>
           </a:p>
         </p:txBody>
       </p:sp>
@@ -1777,11 +1848,11 @@
           <a:bodyPr/>
           <a:lstStyle/>
           <a:p>
-            <a:fld id="{5BCAD085-E8A6-8845-BD4E-CB4CCA059FC4}" type="datetimeFigureOut">
-              <a:rPr lang="en-US" smtClean="0"/>
-              <a:t>1/27/13</a:t>
+            <a:fld id="{A98F60FD-DC1C-204F-8C1F-00DE41EB5C58}" type="datetimeFigureOut">
+              <a:rPr lang="en-AM" smtClean="0"/>
+              <a:t>19.03.24</a:t>
             </a:fld>
-            <a:endParaRPr lang="en-US"/>
+            <a:endParaRPr lang="en-AM"/>
           </a:p>
         </p:txBody>
       </p:sp>
@@ -1800,7 +1871,7 @@
           <a:bodyPr/>
           <a:lstStyle/>
           <a:p>
-            <a:endParaRPr lang="en-US"/>
+            <a:endParaRPr lang="en-AM"/>
           </a:p>
         </p:txBody>
       </p:sp>
@@ -1819,18 +1890,49 @@
           <a:bodyPr/>
           <a:lstStyle/>
           <a:p>
-            <a:fld id="{C1FF6DA9-008F-8B48-92A6-B652298478BF}" type="slidenum">
-              <a:rPr lang="en-US" smtClean="0"/>
+            <a:fld id="{80B75221-7FF7-5846-8D81-216EBB3FA69A}" type="slidenum">
+              <a:rPr lang="en-AM" smtClean="0"/>
               <a:t>‹#›</a:t>
             </a:fld>
-            <a:endParaRPr lang="en-US"/>
-          </a:p>
-        </p:txBody>
-      </p:sp>
+            <a:endParaRPr lang="en-AM"/>
+          </a:p>
+        </p:txBody>
+      </p:sp>
+      <p:cxnSp>
+        <p:nvCxnSpPr>
+          <p:cNvPr id="29" name="Straight Connector 28"/>
+          <p:cNvCxnSpPr/>
+          <p:nvPr/>
+        </p:nvCxnSpPr>
+        <p:spPr>
+          <a:xfrm>
+            <a:off x="1453896" y="1847088"/>
+            <a:ext cx="9607522" cy="0"/>
+          </a:xfrm>
+          <a:prstGeom prst="line">
+            <a:avLst/>
+          </a:prstGeom>
+          <a:ln w="31750"/>
+        </p:spPr>
+        <p:style>
+          <a:lnRef idx="3">
+            <a:schemeClr val="accent1"/>
+          </a:lnRef>
+          <a:fillRef idx="0">
+            <a:schemeClr val="accent1"/>
+          </a:fillRef>
+          <a:effectRef idx="2">
+            <a:schemeClr val="accent1"/>
+          </a:effectRef>
+          <a:fontRef idx="minor">
+            <a:schemeClr val="tx1"/>
+          </a:fontRef>
+        </p:style>
+      </p:cxnSp>
     </p:spTree>
     <p:extLst>
       <p:ext uri="{BB962C8B-B14F-4D97-AF65-F5344CB8AC3E}">
-        <p14:creationId xmlns:p14="http://schemas.microsoft.com/office/powerpoint/2010/main" val="990158736"/>
+        <p14:creationId xmlns:p14="http://schemas.microsoft.com/office/powerpoint/2010/main" val="2937218754"/>
       </p:ext>
     </p:extLst>
   </p:cSld>
@@ -1873,10 +1975,10 @@
           <a:lstStyle/>
           <a:p>
             <a:r>
-              <a:rPr lang="en-US" smtClean="0"/>
+              <a:rPr lang="en-US"/>
               <a:t>Click to edit Master title style</a:t>
             </a:r>
-            <a:endParaRPr lang="en-US"/>
+            <a:endParaRPr lang="en-US" dirty="0"/>
           </a:p>
         </p:txBody>
       </p:sp>
@@ -1895,11 +1997,11 @@
           <a:bodyPr/>
           <a:lstStyle/>
           <a:p>
-            <a:fld id="{5BCAD085-E8A6-8845-BD4E-CB4CCA059FC4}" type="datetimeFigureOut">
-              <a:rPr lang="en-US" smtClean="0"/>
-              <a:t>1/27/13</a:t>
+            <a:fld id="{A98F60FD-DC1C-204F-8C1F-00DE41EB5C58}" type="datetimeFigureOut">
+              <a:rPr lang="en-AM" smtClean="0"/>
+              <a:t>19.03.24</a:t>
             </a:fld>
-            <a:endParaRPr lang="en-US"/>
+            <a:endParaRPr lang="en-AM"/>
           </a:p>
         </p:txBody>
       </p:sp>
@@ -1918,7 +2020,7 @@
           <a:bodyPr/>
           <a:lstStyle/>
           <a:p>
-            <a:endParaRPr lang="en-US"/>
+            <a:endParaRPr lang="en-AM"/>
           </a:p>
         </p:txBody>
       </p:sp>
@@ -1937,18 +2039,49 @@
           <a:bodyPr/>
           <a:lstStyle/>
           <a:p>
-            <a:fld id="{C1FF6DA9-008F-8B48-92A6-B652298478BF}" type="slidenum">
-              <a:rPr lang="en-US" smtClean="0"/>
+            <a:fld id="{80B75221-7FF7-5846-8D81-216EBB3FA69A}" type="slidenum">
+              <a:rPr lang="en-AM" smtClean="0"/>
               <a:t>‹#›</a:t>
             </a:fld>
-            <a:endParaRPr lang="en-US"/>
-          </a:p>
-        </p:txBody>
-      </p:sp>
+            <a:endParaRPr lang="en-AM"/>
+          </a:p>
+        </p:txBody>
+      </p:sp>
+      <p:cxnSp>
+        <p:nvCxnSpPr>
+          <p:cNvPr id="25" name="Straight Connector 24"/>
+          <p:cNvCxnSpPr/>
+          <p:nvPr/>
+        </p:nvCxnSpPr>
+        <p:spPr>
+          <a:xfrm>
+            <a:off x="1453896" y="1847088"/>
+            <a:ext cx="9607522" cy="0"/>
+          </a:xfrm>
+          <a:prstGeom prst="line">
+            <a:avLst/>
+          </a:prstGeom>
+          <a:ln w="31750"/>
+        </p:spPr>
+        <p:style>
+          <a:lnRef idx="3">
+            <a:schemeClr val="accent1"/>
+          </a:lnRef>
+          <a:fillRef idx="0">
+            <a:schemeClr val="accent1"/>
+          </a:fillRef>
+          <a:effectRef idx="2">
+            <a:schemeClr val="accent1"/>
+          </a:effectRef>
+          <a:fontRef idx="minor">
+            <a:schemeClr val="tx1"/>
+          </a:fontRef>
+        </p:style>
+      </p:cxnSp>
     </p:spTree>
     <p:extLst>
       <p:ext uri="{BB962C8B-B14F-4D97-AF65-F5344CB8AC3E}">
-        <p14:creationId xmlns:p14="http://schemas.microsoft.com/office/powerpoint/2010/main" val="727027711"/>
+        <p14:creationId xmlns:p14="http://schemas.microsoft.com/office/powerpoint/2010/main" val="1111330508"/>
       </p:ext>
     </p:extLst>
   </p:cSld>
@@ -1990,11 +2123,11 @@
           <a:bodyPr/>
           <a:lstStyle/>
           <a:p>
-            <a:fld id="{5BCAD085-E8A6-8845-BD4E-CB4CCA059FC4}" type="datetimeFigureOut">
-              <a:rPr lang="en-US" smtClean="0"/>
-              <a:t>1/27/13</a:t>
+            <a:fld id="{A98F60FD-DC1C-204F-8C1F-00DE41EB5C58}" type="datetimeFigureOut">
+              <a:rPr lang="en-AM" smtClean="0"/>
+              <a:t>19.03.24</a:t>
             </a:fld>
-            <a:endParaRPr lang="en-US"/>
+            <a:endParaRPr lang="en-AM"/>
           </a:p>
         </p:txBody>
       </p:sp>
@@ -2013,7 +2146,7 @@
           <a:bodyPr/>
           <a:lstStyle/>
           <a:p>
-            <a:endParaRPr lang="en-US"/>
+            <a:endParaRPr lang="en-AM"/>
           </a:p>
         </p:txBody>
       </p:sp>
@@ -2032,18 +2165,18 @@
           <a:bodyPr/>
           <a:lstStyle/>
           <a:p>
-            <a:fld id="{C1FF6DA9-008F-8B48-92A6-B652298478BF}" type="slidenum">
-              <a:rPr lang="en-US" smtClean="0"/>
+            <a:fld id="{80B75221-7FF7-5846-8D81-216EBB3FA69A}" type="slidenum">
+              <a:rPr lang="en-AM" smtClean="0"/>
               <a:t>‹#›</a:t>
             </a:fld>
-            <a:endParaRPr lang="en-US"/>
+            <a:endParaRPr lang="en-AM"/>
           </a:p>
         </p:txBody>
       </p:sp>
     </p:spTree>
     <p:extLst>
       <p:ext uri="{BB962C8B-B14F-4D97-AF65-F5344CB8AC3E}">
-        <p14:creationId xmlns:p14="http://schemas.microsoft.com/office/powerpoint/2010/main" val="1212999818"/>
+        <p14:creationId xmlns:p14="http://schemas.microsoft.com/office/powerpoint/2010/main" val="2221443804"/>
       </p:ext>
     </p:extLst>
   </p:cSld>
@@ -2082,23 +2215,25 @@
         </p:nvSpPr>
         <p:spPr>
           <a:xfrm>
-            <a:off x="457200" y="273050"/>
-            <a:ext cx="3008313" cy="1162050"/>
+            <a:off x="1444671" y="798973"/>
+            <a:ext cx="3273099" cy="2247117"/>
           </a:xfrm>
         </p:spPr>
         <p:txBody>
-          <a:bodyPr anchor="b"/>
+          <a:bodyPr anchor="b">
+            <a:normAutofit/>
+          </a:bodyPr>
           <a:lstStyle>
             <a:lvl1pPr algn="l">
-              <a:defRPr sz="2000" b="1"/>
+              <a:defRPr sz="2400"/>
             </a:lvl1pPr>
           </a:lstStyle>
           <a:p>
             <a:r>
-              <a:rPr lang="en-US" smtClean="0"/>
+              <a:rPr lang="en-US"/>
               <a:t>Click to edit Master title style</a:t>
             </a:r>
-            <a:endParaRPr lang="en-US"/>
+            <a:endParaRPr lang="en-US" dirty="0"/>
           </a:p>
         </p:txBody>
       </p:sp>
@@ -2114,213 +2249,216 @@
         </p:nvSpPr>
         <p:spPr>
           <a:xfrm>
-            <a:off x="3575050" y="273050"/>
-            <a:ext cx="5111750" cy="5853113"/>
+            <a:off x="5043714" y="798974"/>
+            <a:ext cx="6012470" cy="4658826"/>
           </a:xfrm>
         </p:spPr>
         <p:txBody>
+          <a:bodyPr anchor="ctr"/>
+          <a:lstStyle/>
+          <a:p>
+            <a:pPr lvl="0"/>
+            <a:r>
+              <a:rPr lang="en-US"/>
+              <a:t>Click to edit Master text styles</a:t>
+            </a:r>
+          </a:p>
+          <a:p>
+            <a:pPr lvl="1"/>
+            <a:r>
+              <a:rPr lang="en-US"/>
+              <a:t>Second level</a:t>
+            </a:r>
+          </a:p>
+          <a:p>
+            <a:pPr lvl="2"/>
+            <a:r>
+              <a:rPr lang="en-US"/>
+              <a:t>Third level</a:t>
+            </a:r>
+          </a:p>
+          <a:p>
+            <a:pPr lvl="3"/>
+            <a:r>
+              <a:rPr lang="en-US"/>
+              <a:t>Fourth level</a:t>
+            </a:r>
+          </a:p>
+          <a:p>
+            <a:pPr lvl="4"/>
+            <a:r>
+              <a:rPr lang="en-US"/>
+              <a:t>Fifth level</a:t>
+            </a:r>
+            <a:endParaRPr lang="en-US" dirty="0"/>
+          </a:p>
+        </p:txBody>
+      </p:sp>
+      <p:sp>
+        <p:nvSpPr>
+          <p:cNvPr id="4" name="Text Placeholder 3"/>
+          <p:cNvSpPr>
+            <a:spLocks noGrp="1"/>
+          </p:cNvSpPr>
+          <p:nvPr>
+            <p:ph type="body" sz="half" idx="2"/>
+          </p:nvPr>
+        </p:nvSpPr>
+        <p:spPr>
+          <a:xfrm>
+            <a:off x="1444671" y="3205491"/>
+            <a:ext cx="3275013" cy="2248181"/>
+          </a:xfrm>
+        </p:spPr>
+        <p:txBody>
           <a:bodyPr/>
           <a:lstStyle>
-            <a:lvl1pPr>
-              <a:defRPr sz="3200"/>
+            <a:lvl1pPr marL="0" indent="0" algn="l">
+              <a:buNone/>
+              <a:defRPr sz="1600"/>
             </a:lvl1pPr>
-            <a:lvl2pPr>
-              <a:defRPr sz="2800"/>
+            <a:lvl2pPr marL="457200" indent="0">
+              <a:buNone/>
+              <a:defRPr sz="1400"/>
             </a:lvl2pPr>
-            <a:lvl3pPr>
-              <a:defRPr sz="2400"/>
+            <a:lvl3pPr marL="914400" indent="0">
+              <a:buNone/>
+              <a:defRPr sz="1200"/>
             </a:lvl3pPr>
-            <a:lvl4pPr>
-              <a:defRPr sz="2000"/>
+            <a:lvl4pPr marL="1371600" indent="0">
+              <a:buNone/>
+              <a:defRPr sz="1000"/>
             </a:lvl4pPr>
-            <a:lvl5pPr>
-              <a:defRPr sz="2000"/>
+            <a:lvl5pPr marL="1828800" indent="0">
+              <a:buNone/>
+              <a:defRPr sz="1000"/>
             </a:lvl5pPr>
-            <a:lvl6pPr>
-              <a:defRPr sz="2000"/>
+            <a:lvl6pPr marL="2286000" indent="0">
+              <a:buNone/>
+              <a:defRPr sz="1000"/>
             </a:lvl6pPr>
-            <a:lvl7pPr>
-              <a:defRPr sz="2000"/>
+            <a:lvl7pPr marL="2743200" indent="0">
+              <a:buNone/>
+              <a:defRPr sz="1000"/>
             </a:lvl7pPr>
-            <a:lvl8pPr>
-              <a:defRPr sz="2000"/>
+            <a:lvl8pPr marL="3200400" indent="0">
+              <a:buNone/>
+              <a:defRPr sz="1000"/>
             </a:lvl8pPr>
-            <a:lvl9pPr>
-              <a:defRPr sz="2000"/>
+            <a:lvl9pPr marL="3657600" indent="0">
+              <a:buNone/>
+              <a:defRPr sz="1000"/>
             </a:lvl9pPr>
           </a:lstStyle>
           <a:p>
             <a:pPr lvl="0"/>
             <a:r>
-              <a:rPr lang="en-US" smtClean="0"/>
+              <a:rPr lang="en-US"/>
               <a:t>Click to edit Master text styles</a:t>
             </a:r>
           </a:p>
-          <a:p>
-            <a:pPr lvl="1"/>
-            <a:r>
-              <a:rPr lang="en-US" smtClean="0"/>
-              <a:t>Second level</a:t>
-            </a:r>
-          </a:p>
-          <a:p>
-            <a:pPr lvl="2"/>
-            <a:r>
-              <a:rPr lang="en-US" smtClean="0"/>
-              <a:t>Third level</a:t>
-            </a:r>
-          </a:p>
-          <a:p>
-            <a:pPr lvl="3"/>
-            <a:r>
-              <a:rPr lang="en-US" smtClean="0"/>
-              <a:t>Fourth level</a:t>
-            </a:r>
-          </a:p>
-          <a:p>
-            <a:pPr lvl="4"/>
-            <a:r>
-              <a:rPr lang="en-US" smtClean="0"/>
-              <a:t>Fifth level</a:t>
-            </a:r>
-            <a:endParaRPr lang="en-US"/>
-          </a:p>
-        </p:txBody>
-      </p:sp>
-      <p:sp>
-        <p:nvSpPr>
-          <p:cNvPr id="4" name="Text Placeholder 3"/>
-          <p:cNvSpPr>
-            <a:spLocks noGrp="1"/>
-          </p:cNvSpPr>
-          <p:nvPr>
-            <p:ph type="body" sz="half" idx="2"/>
-          </p:nvPr>
-        </p:nvSpPr>
+        </p:txBody>
+      </p:sp>
+      <p:sp>
+        <p:nvSpPr>
+          <p:cNvPr id="5" name="Date Placeholder 4"/>
+          <p:cNvSpPr>
+            <a:spLocks noGrp="1"/>
+          </p:cNvSpPr>
+          <p:nvPr>
+            <p:ph type="dt" sz="half" idx="10"/>
+          </p:nvPr>
+        </p:nvSpPr>
+        <p:spPr/>
+        <p:txBody>
+          <a:bodyPr/>
+          <a:lstStyle/>
+          <a:p>
+            <a:fld id="{A98F60FD-DC1C-204F-8C1F-00DE41EB5C58}" type="datetimeFigureOut">
+              <a:rPr lang="en-AM" smtClean="0"/>
+              <a:t>19.03.24</a:t>
+            </a:fld>
+            <a:endParaRPr lang="en-AM"/>
+          </a:p>
+        </p:txBody>
+      </p:sp>
+      <p:sp>
+        <p:nvSpPr>
+          <p:cNvPr id="6" name="Footer Placeholder 5"/>
+          <p:cNvSpPr>
+            <a:spLocks noGrp="1"/>
+          </p:cNvSpPr>
+          <p:nvPr>
+            <p:ph type="ftr" sz="quarter" idx="11"/>
+          </p:nvPr>
+        </p:nvSpPr>
+        <p:spPr/>
+        <p:txBody>
+          <a:bodyPr/>
+          <a:lstStyle/>
+          <a:p>
+            <a:endParaRPr lang="en-AM"/>
+          </a:p>
+        </p:txBody>
+      </p:sp>
+      <p:sp>
+        <p:nvSpPr>
+          <p:cNvPr id="7" name="Slide Number Placeholder 6"/>
+          <p:cNvSpPr>
+            <a:spLocks noGrp="1"/>
+          </p:cNvSpPr>
+          <p:nvPr>
+            <p:ph type="sldNum" sz="quarter" idx="12"/>
+          </p:nvPr>
+        </p:nvSpPr>
+        <p:spPr/>
+        <p:txBody>
+          <a:bodyPr/>
+          <a:lstStyle/>
+          <a:p>
+            <a:fld id="{80B75221-7FF7-5846-8D81-216EBB3FA69A}" type="slidenum">
+              <a:rPr lang="en-AM" smtClean="0"/>
+              <a:t>‹#›</a:t>
+            </a:fld>
+            <a:endParaRPr lang="en-AM"/>
+          </a:p>
+        </p:txBody>
+      </p:sp>
+      <p:cxnSp>
+        <p:nvCxnSpPr>
+          <p:cNvPr id="17" name="Straight Connector 16"/>
+          <p:cNvCxnSpPr/>
+          <p:nvPr/>
+        </p:nvCxnSpPr>
         <p:spPr>
           <a:xfrm>
-            <a:off x="457200" y="1435100"/>
-            <a:ext cx="3008313" cy="4691063"/>
+            <a:off x="1448280" y="3205491"/>
+            <a:ext cx="3269490" cy="0"/>
           </a:xfrm>
+          <a:prstGeom prst="line">
+            <a:avLst/>
+          </a:prstGeom>
+          <a:ln w="31750"/>
         </p:spPr>
-        <p:txBody>
-          <a:bodyPr/>
-          <a:lstStyle>
-            <a:lvl1pPr marL="0" indent="0">
-              <a:buNone/>
-              <a:defRPr sz="1400"/>
-            </a:lvl1pPr>
-            <a:lvl2pPr marL="457200" indent="0">
-              <a:buNone/>
-              <a:defRPr sz="1200"/>
-            </a:lvl2pPr>
-            <a:lvl3pPr marL="914400" indent="0">
-              <a:buNone/>
-              <a:defRPr sz="1000"/>
-            </a:lvl3pPr>
-            <a:lvl4pPr marL="1371600" indent="0">
-              <a:buNone/>
-              <a:defRPr sz="900"/>
-            </a:lvl4pPr>
-            <a:lvl5pPr marL="1828800" indent="0">
-              <a:buNone/>
-              <a:defRPr sz="900"/>
-            </a:lvl5pPr>
-            <a:lvl6pPr marL="2286000" indent="0">
-              <a:buNone/>
-              <a:defRPr sz="900"/>
-            </a:lvl6pPr>
-            <a:lvl7pPr marL="2743200" indent="0">
-              <a:buNone/>
-              <a:defRPr sz="900"/>
-            </a:lvl7pPr>
-            <a:lvl8pPr marL="3200400" indent="0">
-              <a:buNone/>
-              <a:defRPr sz="900"/>
-            </a:lvl8pPr>
-            <a:lvl9pPr marL="3657600" indent="0">
-              <a:buNone/>
-              <a:defRPr sz="900"/>
-            </a:lvl9pPr>
-          </a:lstStyle>
-          <a:p>
-            <a:pPr lvl="0"/>
-            <a:r>
-              <a:rPr lang="en-US" smtClean="0"/>
-              <a:t>Click to edit Master text styles</a:t>
-            </a:r>
-          </a:p>
-        </p:txBody>
-      </p:sp>
-      <p:sp>
-        <p:nvSpPr>
-          <p:cNvPr id="5" name="Date Placeholder 4"/>
-          <p:cNvSpPr>
-            <a:spLocks noGrp="1"/>
-          </p:cNvSpPr>
-          <p:nvPr>
-            <p:ph type="dt" sz="half" idx="10"/>
-          </p:nvPr>
-        </p:nvSpPr>
-        <p:spPr/>
-        <p:txBody>
-          <a:bodyPr/>
-          <a:lstStyle/>
-          <a:p>
-            <a:fld id="{5BCAD085-E8A6-8845-BD4E-CB4CCA059FC4}" type="datetimeFigureOut">
-              <a:rPr lang="en-US" smtClean="0"/>
-              <a:t>1/27/13</a:t>
-            </a:fld>
-            <a:endParaRPr lang="en-US"/>
-          </a:p>
-        </p:txBody>
-      </p:sp>
-      <p:sp>
-        <p:nvSpPr>
-          <p:cNvPr id="6" name="Footer Placeholder 5"/>
-          <p:cNvSpPr>
-            <a:spLocks noGrp="1"/>
-          </p:cNvSpPr>
-          <p:nvPr>
-            <p:ph type="ftr" sz="quarter" idx="11"/>
-          </p:nvPr>
-        </p:nvSpPr>
-        <p:spPr/>
-        <p:txBody>
-          <a:bodyPr/>
-          <a:lstStyle/>
-          <a:p>
-            <a:endParaRPr lang="en-US"/>
-          </a:p>
-        </p:txBody>
-      </p:sp>
-      <p:sp>
-        <p:nvSpPr>
-          <p:cNvPr id="7" name="Slide Number Placeholder 6"/>
-          <p:cNvSpPr>
-            <a:spLocks noGrp="1"/>
-          </p:cNvSpPr>
-          <p:nvPr>
-            <p:ph type="sldNum" sz="quarter" idx="12"/>
-          </p:nvPr>
-        </p:nvSpPr>
-        <p:spPr/>
-        <p:txBody>
-          <a:bodyPr/>
-          <a:lstStyle/>
-          <a:p>
-            <a:fld id="{C1FF6DA9-008F-8B48-92A6-B652298478BF}" type="slidenum">
-              <a:rPr lang="en-US" smtClean="0"/>
-              <a:t>‹#›</a:t>
-            </a:fld>
-            <a:endParaRPr lang="en-US"/>
-          </a:p>
-        </p:txBody>
-      </p:sp>
+        <p:style>
+          <a:lnRef idx="3">
+            <a:schemeClr val="accent1"/>
+          </a:lnRef>
+          <a:fillRef idx="0">
+            <a:schemeClr val="accent1"/>
+          </a:fillRef>
+          <a:effectRef idx="2">
+            <a:schemeClr val="accent1"/>
+          </a:effectRef>
+          <a:fontRef idx="minor">
+            <a:schemeClr val="tx1"/>
+          </a:fontRef>
+        </p:style>
+      </p:cxnSp>
     </p:spTree>
     <p:extLst>
       <p:ext uri="{BB962C8B-B14F-4D97-AF65-F5344CB8AC3E}">
-        <p14:creationId xmlns:p14="http://schemas.microsoft.com/office/powerpoint/2010/main" val="1840726560"/>
+        <p14:creationId xmlns:p14="http://schemas.microsoft.com/office/powerpoint/2010/main" val="211984913"/>
       </p:ext>
     </p:extLst>
   </p:cSld>
@@ -2347,6 +2485,140 @@
           <a:chExt cx="0" cy="0"/>
         </a:xfrm>
       </p:grpSpPr>
+      <p:grpSp>
+        <p:nvGrpSpPr>
+          <p:cNvPr id="8" name="Group 7"/>
+          <p:cNvGrpSpPr/>
+          <p:nvPr/>
+        </p:nvGrpSpPr>
+        <p:grpSpPr>
+          <a:xfrm>
+            <a:off x="7477387" y="482170"/>
+            <a:ext cx="4074533" cy="5149101"/>
+            <a:chOff x="7477387" y="482170"/>
+            <a:chExt cx="4074533" cy="5149101"/>
+          </a:xfrm>
+        </p:grpSpPr>
+        <p:sp>
+          <p:nvSpPr>
+            <p:cNvPr id="18" name="Rectangle 17"/>
+            <p:cNvSpPr/>
+            <p:nvPr/>
+          </p:nvSpPr>
+          <p:spPr bwMode="black">
+            <a:xfrm>
+              <a:off x="7477387" y="482170"/>
+              <a:ext cx="4074533" cy="5149101"/>
+            </a:xfrm>
+            <a:prstGeom prst="rect">
+              <a:avLst/>
+            </a:prstGeom>
+            <a:gradFill>
+              <a:gsLst>
+                <a:gs pos="0">
+                  <a:srgbClr val="000001"/>
+                </a:gs>
+                <a:gs pos="100000">
+                  <a:srgbClr val="191919"/>
+                </a:gs>
+              </a:gsLst>
+            </a:gradFill>
+            <a:ln w="76200" cmpd="sng">
+              <a:noFill/>
+              <a:miter lim="800000"/>
+            </a:ln>
+            <a:effectLst>
+              <a:outerShdw blurRad="127000" dist="228600" dir="4740000" sx="98000" sy="98000" algn="tl" rotWithShape="0">
+                <a:srgbClr val="000000">
+                  <a:alpha val="34000"/>
+                </a:srgbClr>
+              </a:outerShdw>
+            </a:effectLst>
+            <a:scene3d>
+              <a:camera prst="orthographicFront"/>
+              <a:lightRig rig="threePt" dir="t"/>
+            </a:scene3d>
+            <a:sp3d>
+              <a:bevelT w="152400" h="50800" prst="softRound"/>
+            </a:sp3d>
+          </p:spPr>
+          <p:style>
+            <a:lnRef idx="1">
+              <a:schemeClr val="accent1"/>
+            </a:lnRef>
+            <a:fillRef idx="3">
+              <a:schemeClr val="accent1"/>
+            </a:fillRef>
+            <a:effectRef idx="2">
+              <a:schemeClr val="accent1"/>
+            </a:effectRef>
+            <a:fontRef idx="minor">
+              <a:schemeClr val="lt1"/>
+            </a:fontRef>
+          </p:style>
+        </p:sp>
+        <p:sp>
+          <p:nvSpPr>
+            <p:cNvPr id="19" name="Rectangle 18"/>
+            <p:cNvSpPr/>
+            <p:nvPr/>
+          </p:nvSpPr>
+          <p:spPr bwMode="blackWhite">
+            <a:xfrm>
+              <a:off x="7790446" y="812506"/>
+              <a:ext cx="3450289" cy="4466452"/>
+            </a:xfrm>
+            <a:prstGeom prst="rect">
+              <a:avLst/>
+            </a:prstGeom>
+            <a:gradFill>
+              <a:gsLst>
+                <a:gs pos="0">
+                  <a:srgbClr val="DADADA"/>
+                </a:gs>
+                <a:gs pos="100000">
+                  <a:srgbClr val="FFFFFE"/>
+                </a:gs>
+              </a:gsLst>
+              <a:lin ang="16200000" scaled="0"/>
+            </a:gradFill>
+            <a:ln w="50800" cmpd="sng">
+              <a:solidFill>
+                <a:srgbClr val="191919"/>
+              </a:solidFill>
+              <a:miter lim="800000"/>
+            </a:ln>
+            <a:effectLst>
+              <a:innerShdw blurRad="63500" dist="88900" dir="14100000">
+                <a:srgbClr val="000000">
+                  <a:alpha val="30000"/>
+                </a:srgbClr>
+              </a:innerShdw>
+            </a:effectLst>
+            <a:scene3d>
+              <a:camera prst="orthographicFront"/>
+              <a:lightRig rig="threePt" dir="t"/>
+            </a:scene3d>
+            <a:sp3d>
+              <a:bevelT prst="relaxedInset"/>
+            </a:sp3d>
+          </p:spPr>
+          <p:style>
+            <a:lnRef idx="1">
+              <a:schemeClr val="accent1"/>
+            </a:lnRef>
+            <a:fillRef idx="3">
+              <a:schemeClr val="accent1"/>
+            </a:fillRef>
+            <a:effectRef idx="2">
+              <a:schemeClr val="accent1"/>
+            </a:effectRef>
+            <a:fontRef idx="minor">
+              <a:schemeClr val="lt1"/>
+            </a:fontRef>
+          </p:style>
+        </p:sp>
+      </p:grpSp>
       <p:sp>
         <p:nvSpPr>
           <p:cNvPr id="2" name="Title 1"/>
@@ -2359,23 +2631,25 @@
         </p:nvSpPr>
         <p:spPr>
           <a:xfrm>
-            <a:off x="1792288" y="4800600"/>
-            <a:ext cx="5486400" cy="566738"/>
+            <a:off x="1451206" y="1129513"/>
+            <a:ext cx="5532328" cy="1830584"/>
           </a:xfrm>
         </p:spPr>
         <p:txBody>
-          <a:bodyPr anchor="b"/>
+          <a:bodyPr anchor="b">
+            <a:normAutofit/>
+          </a:bodyPr>
           <a:lstStyle>
-            <a:lvl1pPr algn="l">
-              <a:defRPr sz="2000" b="1"/>
+            <a:lvl1pPr>
+              <a:defRPr sz="3200"/>
             </a:lvl1pPr>
           </a:lstStyle>
           <a:p>
             <a:r>
-              <a:rPr lang="en-US" smtClean="0"/>
+              <a:rPr lang="en-US"/>
               <a:t>Click to edit Master title style</a:t>
             </a:r>
-            <a:endParaRPr lang="en-US"/>
+            <a:endParaRPr lang="en-US" dirty="0"/>
           </a:p>
         </p:txBody>
       </p:sp>
@@ -2383,7 +2657,7 @@
         <p:nvSpPr>
           <p:cNvPr id="3" name="Picture Placeholder 2"/>
           <p:cNvSpPr>
-            <a:spLocks noGrp="1"/>
+            <a:spLocks noGrp="1" noChangeAspect="1"/>
           </p:cNvSpPr>
           <p:nvPr>
             <p:ph type="pic" idx="1"/>
@@ -2391,14 +2665,24 @@
         </p:nvSpPr>
         <p:spPr>
           <a:xfrm>
-            <a:off x="1792288" y="612775"/>
-            <a:ext cx="5486400" cy="4114800"/>
+            <a:off x="8124389" y="1122542"/>
+            <a:ext cx="2791171" cy="3866327"/>
           </a:xfrm>
+          <a:solidFill>
+            <a:schemeClr val="bg1">
+              <a:lumMod val="85000"/>
+            </a:schemeClr>
+          </a:solidFill>
+          <a:ln w="9525" cap="sq">
+            <a:noFill/>
+            <a:miter lim="800000"/>
+          </a:ln>
+          <a:effectLst/>
         </p:spPr>
         <p:txBody>
-          <a:bodyPr/>
+          <a:bodyPr anchor="t"/>
           <a:lstStyle>
-            <a:lvl1pPr marL="0" indent="0">
+            <a:lvl1pPr marL="0" indent="0" algn="ctr">
               <a:buNone/>
               <a:defRPr sz="3200"/>
             </a:lvl1pPr>
@@ -2436,7 +2720,11 @@
             </a:lvl9pPr>
           </a:lstStyle>
           <a:p>
-            <a:endParaRPr lang="en-US"/>
+            <a:r>
+              <a:rPr lang="en-US"/>
+              <a:t>Click icon to add picture</a:t>
+            </a:r>
+            <a:endParaRPr lang="en-US" dirty="0"/>
           </a:p>
         </p:txBody>
       </p:sp>
@@ -2452,54 +2740,56 @@
         </p:nvSpPr>
         <p:spPr>
           <a:xfrm>
-            <a:off x="1792288" y="5367338"/>
-            <a:ext cx="5486400" cy="804862"/>
+            <a:off x="1450329" y="3145992"/>
+            <a:ext cx="5524404" cy="2003742"/>
           </a:xfrm>
         </p:spPr>
         <p:txBody>
-          <a:bodyPr/>
+          <a:bodyPr>
+            <a:normAutofit/>
+          </a:bodyPr>
           <a:lstStyle>
-            <a:lvl1pPr marL="0" indent="0">
-              <a:buNone/>
-              <a:defRPr sz="1400"/>
+            <a:lvl1pPr marL="0" indent="0" algn="l">
+              <a:buNone/>
+              <a:defRPr sz="1800"/>
             </a:lvl1pPr>
             <a:lvl2pPr marL="457200" indent="0">
               <a:buNone/>
-              <a:defRPr sz="1200"/>
+              <a:defRPr sz="1400"/>
             </a:lvl2pPr>
             <a:lvl3pPr marL="914400" indent="0">
               <a:buNone/>
-              <a:defRPr sz="1000"/>
+              <a:defRPr sz="1200"/>
             </a:lvl3pPr>
             <a:lvl4pPr marL="1371600" indent="0">
               <a:buNone/>
-              <a:defRPr sz="900"/>
+              <a:defRPr sz="1000"/>
             </a:lvl4pPr>
             <a:lvl5pPr marL="1828800" indent="0">
               <a:buNone/>
-              <a:defRPr sz="900"/>
+              <a:defRPr sz="1000"/>
             </a:lvl5pPr>
             <a:lvl6pPr marL="2286000" indent="0">
               <a:buNone/>
-              <a:defRPr sz="900"/>
+              <a:defRPr sz="1000"/>
             </a:lvl6pPr>
             <a:lvl7pPr marL="2743200" indent="0">
               <a:buNone/>
-              <a:defRPr sz="900"/>
+              <a:defRPr sz="1000"/>
             </a:lvl7pPr>
             <a:lvl8pPr marL="3200400" indent="0">
               <a:buNone/>
-              <a:defRPr sz="900"/>
+              <a:defRPr sz="1000"/>
             </a:lvl8pPr>
             <a:lvl9pPr marL="3657600" indent="0">
               <a:buNone/>
-              <a:defRPr sz="900"/>
+              <a:defRPr sz="1000"/>
             </a:lvl9pPr>
           </a:lstStyle>
           <a:p>
             <a:pPr lvl="0"/>
             <a:r>
-              <a:rPr lang="en-US" smtClean="0"/>
+              <a:rPr lang="en-US"/>
               <a:t>Click to edit Master text styles</a:t>
             </a:r>
           </a:p>
@@ -2515,16 +2805,25 @@
             <p:ph type="dt" sz="half" idx="10"/>
           </p:nvPr>
         </p:nvSpPr>
-        <p:spPr/>
-        <p:txBody>
-          <a:bodyPr/>
-          <a:lstStyle/>
-          <a:p>
-            <a:fld id="{5BCAD085-E8A6-8845-BD4E-CB4CCA059FC4}" type="datetimeFigureOut">
-              <a:rPr lang="en-US" smtClean="0"/>
-              <a:t>1/27/13</a:t>
+        <p:spPr>
+          <a:xfrm>
+            <a:off x="1447382" y="5469856"/>
+            <a:ext cx="5527351" cy="320123"/>
+          </a:xfrm>
+        </p:spPr>
+        <p:txBody>
+          <a:bodyPr/>
+          <a:lstStyle>
+            <a:lvl1pPr algn="l">
+              <a:defRPr/>
+            </a:lvl1pPr>
+          </a:lstStyle>
+          <a:p>
+            <a:fld id="{A98F60FD-DC1C-204F-8C1F-00DE41EB5C58}" type="datetimeFigureOut">
+              <a:rPr lang="en-AM" smtClean="0"/>
+              <a:t>19.03.24</a:t>
             </a:fld>
-            <a:endParaRPr lang="en-US"/>
+            <a:endParaRPr lang="en-AM"/>
           </a:p>
         </p:txBody>
       </p:sp>
@@ -2538,12 +2837,17 @@
             <p:ph type="ftr" sz="quarter" idx="11"/>
           </p:nvPr>
         </p:nvSpPr>
-        <p:spPr/>
-        <p:txBody>
-          <a:bodyPr/>
-          <a:lstStyle/>
-          <a:p>
-            <a:endParaRPr lang="en-US"/>
+        <p:spPr>
+          <a:xfrm>
+            <a:off x="1447382" y="318640"/>
+            <a:ext cx="5541004" cy="320931"/>
+          </a:xfrm>
+        </p:spPr>
+        <p:txBody>
+          <a:bodyPr/>
+          <a:lstStyle/>
+          <a:p>
+            <a:endParaRPr lang="en-AM"/>
           </a:p>
         </p:txBody>
       </p:sp>
@@ -2562,18 +2866,49 @@
           <a:bodyPr/>
           <a:lstStyle/>
           <a:p>
-            <a:fld id="{C1FF6DA9-008F-8B48-92A6-B652298478BF}" type="slidenum">
-              <a:rPr lang="en-US" smtClean="0"/>
+            <a:fld id="{80B75221-7FF7-5846-8D81-216EBB3FA69A}" type="slidenum">
+              <a:rPr lang="en-AM" smtClean="0"/>
               <a:t>‹#›</a:t>
             </a:fld>
-            <a:endParaRPr lang="en-US"/>
-          </a:p>
-        </p:txBody>
-      </p:sp>
+            <a:endParaRPr lang="en-AM"/>
+          </a:p>
+        </p:txBody>
+      </p:sp>
+      <p:cxnSp>
+        <p:nvCxnSpPr>
+          <p:cNvPr id="31" name="Straight Connector 30"/>
+          <p:cNvCxnSpPr/>
+          <p:nvPr/>
+        </p:nvCxnSpPr>
+        <p:spPr>
+          <a:xfrm>
+            <a:off x="1447382" y="3143605"/>
+            <a:ext cx="5527351" cy="0"/>
+          </a:xfrm>
+          <a:prstGeom prst="line">
+            <a:avLst/>
+          </a:prstGeom>
+          <a:ln w="31750"/>
+        </p:spPr>
+        <p:style>
+          <a:lnRef idx="3">
+            <a:schemeClr val="accent1"/>
+          </a:lnRef>
+          <a:fillRef idx="0">
+            <a:schemeClr val="accent1"/>
+          </a:fillRef>
+          <a:effectRef idx="2">
+            <a:schemeClr val="accent1"/>
+          </a:effectRef>
+          <a:fontRef idx="minor">
+            <a:schemeClr val="tx1"/>
+          </a:fontRef>
+        </p:style>
+      </p:cxnSp>
     </p:spTree>
     <p:extLst>
       <p:ext uri="{BB962C8B-B14F-4D97-AF65-F5344CB8AC3E}">
-        <p14:creationId xmlns:p14="http://schemas.microsoft.com/office/powerpoint/2010/main" val="3889236939"/>
+        <p14:creationId xmlns:p14="http://schemas.microsoft.com/office/powerpoint/2010/main" val="930504445"/>
       </p:ext>
     </p:extLst>
   </p:cSld>
@@ -2587,8 +2922,8 @@
 <p:sldMaster xmlns:a="http://schemas.openxmlformats.org/drawingml/2006/main" xmlns:r="http://schemas.openxmlformats.org/officeDocument/2006/relationships" xmlns:p="http://schemas.openxmlformats.org/presentationml/2006/main">
   <p:cSld>
     <p:bg>
-      <p:bgRef idx="1001">
-        <a:schemeClr val="bg1"/>
+      <p:bgRef idx="1003">
+        <a:schemeClr val="bg2"/>
       </p:bgRef>
     </p:bg>
     <p:spTree>
@@ -2607,123 +2942,201 @@
       </p:grpSpPr>
       <p:sp>
         <p:nvSpPr>
-          <p:cNvPr id="2" name="Title Placeholder 1"/>
-          <p:cNvSpPr>
-            <a:spLocks noGrp="1"/>
-          </p:cNvSpPr>
-          <p:nvPr>
-            <p:ph type="title"/>
-          </p:nvPr>
+          <p:cNvPr id="8" name="Rectangle 7"/>
+          <p:cNvSpPr/>
+          <p:nvPr/>
         </p:nvSpPr>
         <p:spPr>
           <a:xfrm>
-            <a:off x="457200" y="274638"/>
-            <a:ext cx="8229600" cy="1143000"/>
+            <a:off x="0" y="2019476"/>
+            <a:ext cx="12192000" cy="4105941"/>
+          </a:xfrm>
+          <a:prstGeom prst="rect">
+            <a:avLst/>
+          </a:prstGeom>
+          <a:gradFill flip="none" rotWithShape="1">
+            <a:gsLst>
+              <a:gs pos="0">
+                <a:schemeClr val="bg2">
+                  <a:alpha val="0"/>
+                </a:schemeClr>
+              </a:gs>
+              <a:gs pos="100000">
+                <a:schemeClr val="bg2"/>
+              </a:gs>
+            </a:gsLst>
+            <a:lin ang="5400000" scaled="0"/>
+            <a:tileRect/>
+          </a:gradFill>
+          <a:ln>
+            <a:noFill/>
+          </a:ln>
+        </p:spPr>
+        <p:style>
+          <a:lnRef idx="2">
+            <a:schemeClr val="accent1">
+              <a:shade val="50000"/>
+            </a:schemeClr>
+          </a:lnRef>
+          <a:fillRef idx="1">
+            <a:schemeClr val="accent1"/>
+          </a:fillRef>
+          <a:effectRef idx="0">
+            <a:schemeClr val="accent1"/>
+          </a:effectRef>
+          <a:fontRef idx="minor">
+            <a:schemeClr val="lt1"/>
+          </a:fontRef>
+        </p:style>
+      </p:sp>
+      <p:pic>
+        <p:nvPicPr>
+          <p:cNvPr id="7" name="Picture 6"/>
+          <p:cNvPicPr>
+            <a:picLocks noChangeAspect="1"/>
+          </p:cNvPicPr>
+          <p:nvPr/>
+        </p:nvPicPr>
+        <p:blipFill rotWithShape="1">
+          <a:blip r:embed="rId13">
+            <a:extLst>
+              <a:ext uri="{28A0092B-C50C-407E-A947-70E740481C1C}">
+                <a14:useLocalDpi xmlns:a14="http://schemas.microsoft.com/office/drawing/2010/main" val="0"/>
+              </a:ext>
+            </a:extLst>
+          </a:blip>
+          <a:srcRect t="1538" b="-1538"/>
+          <a:stretch/>
+        </p:blipFill>
+        <p:spPr bwMode="black">
+          <a:xfrm>
+            <a:off x="0" y="6126480"/>
+            <a:ext cx="12192000" cy="742950"/>
           </a:xfrm>
           <a:prstGeom prst="rect">
             <a:avLst/>
           </a:prstGeom>
         </p:spPr>
-        <p:txBody>
-          <a:bodyPr vert="horz" lIns="91440" tIns="45720" rIns="91440" bIns="45720" rtlCol="0" anchor="ctr">
-            <a:normAutofit/>
-          </a:bodyPr>
-          <a:lstStyle/>
-          <a:p>
-            <a:r>
-              <a:rPr lang="en-US" smtClean="0"/>
-              <a:t>Click to edit Master title style</a:t>
-            </a:r>
-            <a:endParaRPr lang="en-US"/>
-          </a:p>
-        </p:txBody>
-      </p:sp>
-      <p:sp>
-        <p:nvSpPr>
-          <p:cNvPr id="3" name="Text Placeholder 2"/>
-          <p:cNvSpPr>
-            <a:spLocks noGrp="1"/>
-          </p:cNvSpPr>
-          <p:nvPr>
-            <p:ph type="body" idx="1"/>
+      </p:pic>
+      <p:sp>
+        <p:nvSpPr>
+          <p:cNvPr id="2" name="Title Placeholder 1"/>
+          <p:cNvSpPr>
+            <a:spLocks noGrp="1"/>
+          </p:cNvSpPr>
+          <p:nvPr>
+            <p:ph type="title"/>
           </p:nvPr>
         </p:nvSpPr>
         <p:spPr>
           <a:xfrm>
-            <a:off x="457200" y="1600200"/>
-            <a:ext cx="8229600" cy="4525963"/>
+            <a:off x="1451579" y="804519"/>
+            <a:ext cx="9603275" cy="1049235"/>
           </a:xfrm>
           <a:prstGeom prst="rect">
             <a:avLst/>
           </a:prstGeom>
         </p:spPr>
         <p:txBody>
-          <a:bodyPr vert="horz" lIns="91440" tIns="45720" rIns="91440" bIns="45720" rtlCol="0">
+          <a:bodyPr vert="horz" lIns="91440" tIns="45720" rIns="91440" bIns="45720" rtlCol="0" anchor="t">
             <a:normAutofit/>
           </a:bodyPr>
           <a:lstStyle/>
           <a:p>
-            <a:pPr lvl="0"/>
-            <a:r>
-              <a:rPr lang="en-US" smtClean="0"/>
-              <a:t>Click to edit Master text styles</a:t>
-            </a:r>
-          </a:p>
-          <a:p>
-            <a:pPr lvl="1"/>
-            <a:r>
-              <a:rPr lang="en-US" smtClean="0"/>
-              <a:t>Second level</a:t>
-            </a:r>
-          </a:p>
-          <a:p>
-            <a:pPr lvl="2"/>
-            <a:r>
-              <a:rPr lang="en-US" smtClean="0"/>
-              <a:t>Third level</a:t>
-            </a:r>
-          </a:p>
-          <a:p>
-            <a:pPr lvl="3"/>
-            <a:r>
-              <a:rPr lang="en-US" smtClean="0"/>
-              <a:t>Fourth level</a:t>
-            </a:r>
-          </a:p>
-          <a:p>
-            <a:pPr lvl="4"/>
-            <a:r>
-              <a:rPr lang="en-US" smtClean="0"/>
-              <a:t>Fifth level</a:t>
-            </a:r>
-            <a:endParaRPr lang="en-US"/>
-          </a:p>
-        </p:txBody>
-      </p:sp>
-      <p:sp>
-        <p:nvSpPr>
-          <p:cNvPr id="4" name="Date Placeholder 3"/>
-          <p:cNvSpPr>
-            <a:spLocks noGrp="1"/>
-          </p:cNvSpPr>
-          <p:nvPr>
-            <p:ph type="dt" sz="half" idx="2"/>
+            <a:r>
+              <a:rPr lang="en-US"/>
+              <a:t>Click to edit Master title style</a:t>
+            </a:r>
+            <a:endParaRPr lang="en-US" dirty="0"/>
+          </a:p>
+        </p:txBody>
+      </p:sp>
+      <p:sp>
+        <p:nvSpPr>
+          <p:cNvPr id="3" name="Text Placeholder 2"/>
+          <p:cNvSpPr>
+            <a:spLocks noGrp="1"/>
+          </p:cNvSpPr>
+          <p:nvPr>
+            <p:ph type="body" idx="1"/>
           </p:nvPr>
         </p:nvSpPr>
         <p:spPr>
           <a:xfrm>
-            <a:off x="457200" y="6356350"/>
-            <a:ext cx="2133600" cy="365125"/>
+            <a:off x="1451579" y="2015732"/>
+            <a:ext cx="9603275" cy="3450613"/>
           </a:xfrm>
           <a:prstGeom prst="rect">
             <a:avLst/>
           </a:prstGeom>
         </p:spPr>
         <p:txBody>
+          <a:bodyPr vert="horz" lIns="91440" tIns="45720" rIns="91440" bIns="45720" rtlCol="0">
+            <a:normAutofit/>
+          </a:bodyPr>
+          <a:lstStyle/>
+          <a:p>
+            <a:pPr lvl="0"/>
+            <a:r>
+              <a:rPr lang="en-US"/>
+              <a:t>Click to edit Master text styles</a:t>
+            </a:r>
+          </a:p>
+          <a:p>
+            <a:pPr lvl="1"/>
+            <a:r>
+              <a:rPr lang="en-US"/>
+              <a:t>Second level</a:t>
+            </a:r>
+          </a:p>
+          <a:p>
+            <a:pPr lvl="2"/>
+            <a:r>
+              <a:rPr lang="en-US"/>
+              <a:t>Third level</a:t>
+            </a:r>
+          </a:p>
+          <a:p>
+            <a:pPr lvl="3"/>
+            <a:r>
+              <a:rPr lang="en-US"/>
+              <a:t>Fourth level</a:t>
+            </a:r>
+          </a:p>
+          <a:p>
+            <a:pPr lvl="4"/>
+            <a:r>
+              <a:rPr lang="en-US"/>
+              <a:t>Fifth level</a:t>
+            </a:r>
+            <a:endParaRPr lang="en-US" dirty="0"/>
+          </a:p>
+        </p:txBody>
+      </p:sp>
+      <p:sp>
+        <p:nvSpPr>
+          <p:cNvPr id="4" name="Date Placeholder 3"/>
+          <p:cNvSpPr>
+            <a:spLocks noGrp="1"/>
+          </p:cNvSpPr>
+          <p:nvPr>
+            <p:ph type="dt" sz="half" idx="2"/>
+          </p:nvPr>
+        </p:nvSpPr>
+        <p:spPr>
+          <a:xfrm>
+            <a:off x="7554138" y="330370"/>
+            <a:ext cx="3500715" cy="309201"/>
+          </a:xfrm>
+          <a:prstGeom prst="rect">
+            <a:avLst/>
+          </a:prstGeom>
+        </p:spPr>
+        <p:txBody>
           <a:bodyPr vert="horz" lIns="91440" tIns="45720" rIns="91440" bIns="45720" rtlCol="0" anchor="ctr"/>
           <a:lstStyle>
-            <a:lvl1pPr algn="l">
-              <a:defRPr sz="1200">
+            <a:lvl1pPr algn="r">
+              <a:defRPr sz="1000">
                 <a:solidFill>
                   <a:schemeClr val="tx1">
                     <a:tint val="75000"/>
@@ -2733,11 +3146,11 @@
             </a:lvl1pPr>
           </a:lstStyle>
           <a:p>
-            <a:fld id="{5BCAD085-E8A6-8845-BD4E-CB4CCA059FC4}" type="datetimeFigureOut">
-              <a:rPr lang="en-US" smtClean="0"/>
-              <a:t>1/27/13</a:t>
+            <a:fld id="{A98F60FD-DC1C-204F-8C1F-00DE41EB5C58}" type="datetimeFigureOut">
+              <a:rPr lang="en-AM" smtClean="0"/>
+              <a:t>19.03.24</a:t>
             </a:fld>
-            <a:endParaRPr lang="en-US"/>
+            <a:endParaRPr lang="en-AM"/>
           </a:p>
         </p:txBody>
       </p:sp>
@@ -2753,8 +3166,8 @@
         </p:nvSpPr>
         <p:spPr>
           <a:xfrm>
-            <a:off x="3124200" y="6356350"/>
-            <a:ext cx="2895600" cy="365125"/>
+            <a:off x="1451579" y="329307"/>
+            <a:ext cx="5938836" cy="309201"/>
           </a:xfrm>
           <a:prstGeom prst="rect">
             <a:avLst/>
@@ -2763,8 +3176,8 @@
         <p:txBody>
           <a:bodyPr vert="horz" lIns="91440" tIns="45720" rIns="91440" bIns="45720" rtlCol="0" anchor="ctr"/>
           <a:lstStyle>
-            <a:lvl1pPr algn="ctr">
-              <a:defRPr sz="1200">
+            <a:lvl1pPr algn="l">
+              <a:defRPr sz="1000">
                 <a:solidFill>
                   <a:schemeClr val="tx1">
                     <a:tint val="75000"/>
@@ -2774,7 +3187,7 @@
             </a:lvl1pPr>
           </a:lstStyle>
           <a:p>
-            <a:endParaRPr lang="en-US"/>
+            <a:endParaRPr lang="en-AM"/>
           </a:p>
         </p:txBody>
       </p:sp>
@@ -2790,67 +3203,106 @@
         </p:nvSpPr>
         <p:spPr>
           <a:xfrm>
-            <a:off x="6553200" y="6356350"/>
-            <a:ext cx="2133600" cy="365125"/>
+            <a:off x="480060" y="798973"/>
+            <a:ext cx="811019" cy="503578"/>
           </a:xfrm>
           <a:prstGeom prst="rect">
             <a:avLst/>
           </a:prstGeom>
         </p:spPr>
         <p:txBody>
-          <a:bodyPr vert="horz" lIns="91440" tIns="45720" rIns="91440" bIns="45720" rtlCol="0" anchor="ctr"/>
+          <a:bodyPr vert="horz" lIns="91440" tIns="45720" rIns="91440" bIns="45720" rtlCol="0" anchor="t"/>
           <a:lstStyle>
             <a:lvl1pPr algn="r">
-              <a:defRPr sz="1200">
+              <a:defRPr sz="2800">
                 <a:solidFill>
-                  <a:schemeClr val="tx1">
-                    <a:tint val="75000"/>
-                  </a:schemeClr>
+                  <a:schemeClr val="accent1"/>
                 </a:solidFill>
               </a:defRPr>
             </a:lvl1pPr>
           </a:lstStyle>
           <a:p>
-            <a:fld id="{C1FF6DA9-008F-8B48-92A6-B652298478BF}" type="slidenum">
-              <a:rPr lang="en-US" smtClean="0"/>
+            <a:fld id="{80B75221-7FF7-5846-8D81-216EBB3FA69A}" type="slidenum">
+              <a:rPr lang="en-AM" smtClean="0"/>
               <a:t>‹#›</a:t>
             </a:fld>
-            <a:endParaRPr lang="en-US"/>
-          </a:p>
-        </p:txBody>
-      </p:sp>
+            <a:endParaRPr lang="en-AM"/>
+          </a:p>
+        </p:txBody>
+      </p:sp>
+      <p:cxnSp>
+        <p:nvCxnSpPr>
+          <p:cNvPr id="10" name="Straight Connector 9"/>
+          <p:cNvCxnSpPr/>
+          <p:nvPr/>
+        </p:nvCxnSpPr>
+        <p:spPr>
+          <a:xfrm>
+            <a:off x="0" y="6128413"/>
+            <a:ext cx="12192000" cy="0"/>
+          </a:xfrm>
+          <a:prstGeom prst="line">
+            <a:avLst/>
+          </a:prstGeom>
+          <a:ln w="12700">
+            <a:solidFill>
+              <a:srgbClr val="000001">
+                <a:alpha val="20000"/>
+              </a:srgbClr>
+            </a:solidFill>
+          </a:ln>
+        </p:spPr>
+        <p:style>
+          <a:lnRef idx="1">
+            <a:schemeClr val="accent1"/>
+          </a:lnRef>
+          <a:fillRef idx="0">
+            <a:schemeClr val="accent1"/>
+          </a:fillRef>
+          <a:effectRef idx="0">
+            <a:schemeClr val="accent1"/>
+          </a:effectRef>
+          <a:fontRef idx="minor">
+            <a:schemeClr val="tx1"/>
+          </a:fontRef>
+        </p:style>
+      </p:cxnSp>
     </p:spTree>
     <p:extLst>
       <p:ext uri="{BB962C8B-B14F-4D97-AF65-F5344CB8AC3E}">
-        <p14:creationId xmlns:p14="http://schemas.microsoft.com/office/powerpoint/2010/main" val="2209977519"/>
+        <p14:creationId xmlns:p14="http://schemas.microsoft.com/office/powerpoint/2010/main" val="1038822162"/>
       </p:ext>
     </p:extLst>
   </p:cSld>
   <p:clrMap bg1="lt1" tx1="dk1" bg2="lt2" tx2="dk2" accent1="accent1" accent2="accent2" accent3="accent3" accent4="accent4" accent5="accent5" accent6="accent6" hlink="hlink" folHlink="folHlink"/>
   <p:sldLayoutIdLst>
-    <p:sldLayoutId id="2147483649" r:id="rId1"/>
-    <p:sldLayoutId id="2147483650" r:id="rId2"/>
-    <p:sldLayoutId id="2147483651" r:id="rId3"/>
-    <p:sldLayoutId id="2147483652" r:id="rId4"/>
-    <p:sldLayoutId id="2147483653" r:id="rId5"/>
-    <p:sldLayoutId id="2147483654" r:id="rId6"/>
-    <p:sldLayoutId id="2147483655" r:id="rId7"/>
-    <p:sldLayoutId id="2147483656" r:id="rId8"/>
-    <p:sldLayoutId id="2147483657" r:id="rId9"/>
-    <p:sldLayoutId id="2147483658" r:id="rId10"/>
-    <p:sldLayoutId id="2147483659" r:id="rId11"/>
+    <p:sldLayoutId id="2147483673" r:id="rId1"/>
+    <p:sldLayoutId id="2147483674" r:id="rId2"/>
+    <p:sldLayoutId id="2147483675" r:id="rId3"/>
+    <p:sldLayoutId id="2147483676" r:id="rId4"/>
+    <p:sldLayoutId id="2147483677" r:id="rId5"/>
+    <p:sldLayoutId id="2147483678" r:id="rId6"/>
+    <p:sldLayoutId id="2147483679" r:id="rId7"/>
+    <p:sldLayoutId id="2147483680" r:id="rId8"/>
+    <p:sldLayoutId id="2147483681" r:id="rId9"/>
+    <p:sldLayoutId id="2147483682" r:id="rId10"/>
+    <p:sldLayoutId id="2147483683" r:id="rId11"/>
   </p:sldLayoutIdLst>
   <p:txStyles>
     <p:titleStyle>
-      <a:lvl1pPr algn="ctr" defTabSz="457200" rtl="0" eaLnBrk="1" latinLnBrk="0" hangingPunct="1">
+      <a:lvl1pPr algn="l" defTabSz="914400" rtl="0" eaLnBrk="1" latinLnBrk="0" hangingPunct="1">
+        <a:lnSpc>
+          <a:spcPct val="90000"/>
+        </a:lnSpc>
         <a:spcBef>
           <a:spcPct val="0"/>
         </a:spcBef>
         <a:buNone/>
-        <a:defRPr sz="4400" kern="1200">
+        <a:defRPr sz="3200" b="0" i="0" kern="1200" cap="all">
           <a:solidFill>
             <a:schemeClr val="tx1"/>
           </a:solidFill>
+          <a:effectLst/>
           <a:latin typeface="+mj-lt"/>
           <a:ea typeface="+mj-ea"/>
           <a:cs typeface="+mj-cs"/>
@@ -2858,136 +3310,208 @@
       </a:lvl1pPr>
     </p:titleStyle>
     <p:bodyStyle>
-      <a:lvl1pPr marL="342900" indent="-342900" algn="l" defTabSz="457200" rtl="0" eaLnBrk="1" latinLnBrk="0" hangingPunct="1">
+      <a:lvl1pPr marL="228600" indent="-228600" algn="l" defTabSz="914400" rtl="0" eaLnBrk="1" latinLnBrk="0" hangingPunct="1">
+        <a:lnSpc>
+          <a:spcPct val="120000"/>
+        </a:lnSpc>
         <a:spcBef>
-          <a:spcPct val="20000"/>
+          <a:spcPts val="1000"/>
         </a:spcBef>
-        <a:buFont typeface="Arial"/>
+        <a:buClr>
+          <a:schemeClr val="accent1"/>
+        </a:buClr>
+        <a:buSzPct val="100000"/>
+        <a:buFont typeface="Arial" panose="020B0604020202020204" pitchFamily="34" charset="0"/>
         <a:buChar char="•"/>
-        <a:defRPr sz="3200" kern="1200">
+        <a:defRPr sz="2000" kern="1200">
           <a:solidFill>
             <a:schemeClr val="tx1"/>
           </a:solidFill>
+          <a:effectLst/>
           <a:latin typeface="+mn-lt"/>
           <a:ea typeface="+mn-ea"/>
           <a:cs typeface="+mn-cs"/>
         </a:defRPr>
       </a:lvl1pPr>
-      <a:lvl2pPr marL="742950" indent="-285750" algn="l" defTabSz="457200" rtl="0" eaLnBrk="1" latinLnBrk="0" hangingPunct="1">
+      <a:lvl2pPr marL="685800" indent="-228600" algn="l" defTabSz="914400" rtl="0" eaLnBrk="1" latinLnBrk="0" hangingPunct="1">
+        <a:lnSpc>
+          <a:spcPct val="120000"/>
+        </a:lnSpc>
         <a:spcBef>
-          <a:spcPct val="20000"/>
+          <a:spcPts val="500"/>
         </a:spcBef>
-        <a:buFont typeface="Arial"/>
-        <a:buChar char="–"/>
-        <a:defRPr sz="2800" kern="1200">
+        <a:buClr>
+          <a:schemeClr val="accent1"/>
+        </a:buClr>
+        <a:buSzPct val="100000"/>
+        <a:buFont typeface="Arial" panose="020B0604020202020204" pitchFamily="34" charset="0"/>
+        <a:buChar char="•"/>
+        <a:defRPr sz="1800" kern="1200" cap="none" baseline="0">
           <a:solidFill>
             <a:schemeClr val="tx1"/>
           </a:solidFill>
+          <a:effectLst/>
           <a:latin typeface="+mn-lt"/>
           <a:ea typeface="+mn-ea"/>
           <a:cs typeface="+mn-cs"/>
         </a:defRPr>
       </a:lvl2pPr>
-      <a:lvl3pPr marL="1143000" indent="-228600" algn="l" defTabSz="457200" rtl="0" eaLnBrk="1" latinLnBrk="0" hangingPunct="1">
+      <a:lvl3pPr marL="1143000" indent="-228600" algn="l" defTabSz="914400" rtl="0" eaLnBrk="1" latinLnBrk="0" hangingPunct="1">
+        <a:lnSpc>
+          <a:spcPct val="120000"/>
+        </a:lnSpc>
         <a:spcBef>
-          <a:spcPct val="20000"/>
+          <a:spcPts val="500"/>
         </a:spcBef>
-        <a:buFont typeface="Arial"/>
+        <a:buClr>
+          <a:schemeClr val="accent1"/>
+        </a:buClr>
+        <a:buSzPct val="100000"/>
+        <a:buFont typeface="Arial" panose="020B0604020202020204" pitchFamily="34" charset="0"/>
         <a:buChar char="•"/>
-        <a:defRPr sz="2400" kern="1200">
+        <a:defRPr sz="1600" kern="1200">
           <a:solidFill>
             <a:schemeClr val="tx1"/>
           </a:solidFill>
+          <a:effectLst/>
           <a:latin typeface="+mn-lt"/>
           <a:ea typeface="+mn-ea"/>
           <a:cs typeface="+mn-cs"/>
         </a:defRPr>
       </a:lvl3pPr>
-      <a:lvl4pPr marL="1600200" indent="-228600" algn="l" defTabSz="457200" rtl="0" eaLnBrk="1" latinLnBrk="0" hangingPunct="1">
+      <a:lvl4pPr marL="1600200" indent="-228600" algn="l" defTabSz="914400" rtl="0" eaLnBrk="1" latinLnBrk="0" hangingPunct="1">
+        <a:lnSpc>
+          <a:spcPct val="120000"/>
+        </a:lnSpc>
         <a:spcBef>
-          <a:spcPct val="20000"/>
+          <a:spcPts val="500"/>
         </a:spcBef>
-        <a:buFont typeface="Arial"/>
-        <a:buChar char="–"/>
-        <a:defRPr sz="2000" kern="1200">
+        <a:buClr>
+          <a:schemeClr val="accent1"/>
+        </a:buClr>
+        <a:buSzPct val="100000"/>
+        <a:buFont typeface="Arial" panose="020B0604020202020204" pitchFamily="34" charset="0"/>
+        <a:buChar char="•"/>
+        <a:defRPr sz="1400" kern="1200" cap="none" baseline="0">
           <a:solidFill>
             <a:schemeClr val="tx1"/>
           </a:solidFill>
+          <a:effectLst/>
           <a:latin typeface="+mn-lt"/>
           <a:ea typeface="+mn-ea"/>
           <a:cs typeface="+mn-cs"/>
         </a:defRPr>
       </a:lvl4pPr>
-      <a:lvl5pPr marL="2057400" indent="-228600" algn="l" defTabSz="457200" rtl="0" eaLnBrk="1" latinLnBrk="0" hangingPunct="1">
+      <a:lvl5pPr marL="2057400" indent="-228600" algn="l" defTabSz="914400" rtl="0" eaLnBrk="1" latinLnBrk="0" hangingPunct="1">
+        <a:lnSpc>
+          <a:spcPct val="120000"/>
+        </a:lnSpc>
         <a:spcBef>
-          <a:spcPct val="20000"/>
+          <a:spcPts val="500"/>
         </a:spcBef>
-        <a:buFont typeface="Arial"/>
-        <a:buChar char="»"/>
-        <a:defRPr sz="2000" kern="1200">
+        <a:buClr>
+          <a:schemeClr val="accent1"/>
+        </a:buClr>
+        <a:buSzPct val="100000"/>
+        <a:buFont typeface="Arial" panose="020B0604020202020204" pitchFamily="34" charset="0"/>
+        <a:buChar char="•"/>
+        <a:defRPr sz="1200" kern="1200">
           <a:solidFill>
             <a:schemeClr val="tx1"/>
           </a:solidFill>
+          <a:effectLst/>
           <a:latin typeface="+mn-lt"/>
           <a:ea typeface="+mn-ea"/>
           <a:cs typeface="+mn-cs"/>
         </a:defRPr>
       </a:lvl5pPr>
-      <a:lvl6pPr marL="2514600" indent="-228600" algn="l" defTabSz="457200" rtl="0" eaLnBrk="1" latinLnBrk="0" hangingPunct="1">
+      <a:lvl6pPr marL="2514600" indent="-228600" algn="l" defTabSz="914400" rtl="0" eaLnBrk="1" latinLnBrk="0" hangingPunct="1">
+        <a:lnSpc>
+          <a:spcPct val="120000"/>
+        </a:lnSpc>
         <a:spcBef>
-          <a:spcPct val="20000"/>
+          <a:spcPts val="500"/>
         </a:spcBef>
-        <a:buFont typeface="Arial"/>
+        <a:buClr>
+          <a:schemeClr val="accent1"/>
+        </a:buClr>
+        <a:buSzPct val="100000"/>
+        <a:buFont typeface="Arial" panose="020B0604020202020204" pitchFamily="34" charset="0"/>
         <a:buChar char="•"/>
-        <a:defRPr sz="2000" kern="1200">
+        <a:defRPr sz="1200" kern="1200">
           <a:solidFill>
             <a:schemeClr val="tx1"/>
           </a:solidFill>
+          <a:effectLst/>
           <a:latin typeface="+mn-lt"/>
           <a:ea typeface="+mn-ea"/>
           <a:cs typeface="+mn-cs"/>
         </a:defRPr>
       </a:lvl6pPr>
-      <a:lvl7pPr marL="2971800" indent="-228600" algn="l" defTabSz="457200" rtl="0" eaLnBrk="1" latinLnBrk="0" hangingPunct="1">
+      <a:lvl7pPr marL="2971800" indent="-228600" algn="l" defTabSz="914400" rtl="0" eaLnBrk="1" latinLnBrk="0" hangingPunct="1">
+        <a:lnSpc>
+          <a:spcPct val="120000"/>
+        </a:lnSpc>
         <a:spcBef>
-          <a:spcPct val="20000"/>
+          <a:spcPts val="500"/>
         </a:spcBef>
-        <a:buFont typeface="Arial"/>
+        <a:buClr>
+          <a:schemeClr val="accent1"/>
+        </a:buClr>
+        <a:buSzPct val="100000"/>
+        <a:buFont typeface="Arial" panose="020B0604020202020204" pitchFamily="34" charset="0"/>
         <a:buChar char="•"/>
-        <a:defRPr sz="2000" kern="1200">
+        <a:defRPr sz="1200" kern="1200">
           <a:solidFill>
             <a:schemeClr val="tx1"/>
           </a:solidFill>
+          <a:effectLst/>
           <a:latin typeface="+mn-lt"/>
           <a:ea typeface="+mn-ea"/>
           <a:cs typeface="+mn-cs"/>
         </a:defRPr>
       </a:lvl7pPr>
-      <a:lvl8pPr marL="3429000" indent="-228600" algn="l" defTabSz="457200" rtl="0" eaLnBrk="1" latinLnBrk="0" hangingPunct="1">
+      <a:lvl8pPr marL="3429000" indent="-228600" algn="l" defTabSz="914400" rtl="0" eaLnBrk="1" latinLnBrk="0" hangingPunct="1">
+        <a:lnSpc>
+          <a:spcPct val="120000"/>
+        </a:lnSpc>
         <a:spcBef>
-          <a:spcPct val="20000"/>
+          <a:spcPts val="500"/>
         </a:spcBef>
-        <a:buFont typeface="Arial"/>
+        <a:buClr>
+          <a:schemeClr val="accent1"/>
+        </a:buClr>
+        <a:buSzPct val="100000"/>
+        <a:buFont typeface="Arial" panose="020B0604020202020204" pitchFamily="34" charset="0"/>
         <a:buChar char="•"/>
-        <a:defRPr sz="2000" kern="1200">
+        <a:defRPr sz="1200" kern="1200" baseline="0">
           <a:solidFill>
             <a:schemeClr val="tx1"/>
           </a:solidFill>
+          <a:effectLst/>
           <a:latin typeface="+mn-lt"/>
           <a:ea typeface="+mn-ea"/>
           <a:cs typeface="+mn-cs"/>
         </a:defRPr>
       </a:lvl8pPr>
-      <a:lvl9pPr marL="3886200" indent="-228600" algn="l" defTabSz="457200" rtl="0" eaLnBrk="1" latinLnBrk="0" hangingPunct="1">
+      <a:lvl9pPr marL="3886200" indent="-228600" algn="l" defTabSz="914400" rtl="0" eaLnBrk="1" latinLnBrk="0" hangingPunct="1">
+        <a:lnSpc>
+          <a:spcPct val="120000"/>
+        </a:lnSpc>
         <a:spcBef>
-          <a:spcPct val="20000"/>
+          <a:spcPts val="500"/>
         </a:spcBef>
-        <a:buFont typeface="Arial"/>
+        <a:buClr>
+          <a:schemeClr val="accent1"/>
+        </a:buClr>
+        <a:buSzPct val="100000"/>
+        <a:buFont typeface="Arial" panose="020B0604020202020204" pitchFamily="34" charset="0"/>
         <a:buChar char="•"/>
-        <a:defRPr sz="2000" kern="1200">
+        <a:defRPr sz="1200" kern="1200" baseline="0">
           <a:solidFill>
             <a:schemeClr val="tx1"/>
           </a:solidFill>
+          <a:effectLst/>
           <a:latin typeface="+mn-lt"/>
           <a:ea typeface="+mn-ea"/>
           <a:cs typeface="+mn-cs"/>
@@ -2998,7 +3522,7 @@
       <a:defPPr>
         <a:defRPr lang="en-US"/>
       </a:defPPr>
-      <a:lvl1pPr marL="0" algn="l" defTabSz="457200" rtl="0" eaLnBrk="1" latinLnBrk="0" hangingPunct="1">
+      <a:lvl1pPr marL="0" algn="l" defTabSz="914400" rtl="0" eaLnBrk="1" latinLnBrk="0" hangingPunct="1">
         <a:defRPr sz="1800" kern="1200">
           <a:solidFill>
             <a:schemeClr val="tx1"/>
@@ -3008,7 +3532,7 @@
           <a:cs typeface="+mn-cs"/>
         </a:defRPr>
       </a:lvl1pPr>
-      <a:lvl2pPr marL="457200" algn="l" defTabSz="457200" rtl="0" eaLnBrk="1" latinLnBrk="0" hangingPunct="1">
+      <a:lvl2pPr marL="457200" algn="l" defTabSz="914400" rtl="0" eaLnBrk="1" latinLnBrk="0" hangingPunct="1">
         <a:defRPr sz="1800" kern="1200">
           <a:solidFill>
             <a:schemeClr val="tx1"/>
@@ -3018,7 +3542,7 @@
           <a:cs typeface="+mn-cs"/>
         </a:defRPr>
       </a:lvl2pPr>
-      <a:lvl3pPr marL="914400" algn="l" defTabSz="457200" rtl="0" eaLnBrk="1" latinLnBrk="0" hangingPunct="1">
+      <a:lvl3pPr marL="914400" algn="l" defTabSz="914400" rtl="0" eaLnBrk="1" latinLnBrk="0" hangingPunct="1">
         <a:defRPr sz="1800" kern="1200">
           <a:solidFill>
             <a:schemeClr val="tx1"/>
@@ -3028,7 +3552,7 @@
           <a:cs typeface="+mn-cs"/>
         </a:defRPr>
       </a:lvl3pPr>
-      <a:lvl4pPr marL="1371600" algn="l" defTabSz="457200" rtl="0" eaLnBrk="1" latinLnBrk="0" hangingPunct="1">
+      <a:lvl4pPr marL="1371600" algn="l" defTabSz="914400" rtl="0" eaLnBrk="1" latinLnBrk="0" hangingPunct="1">
         <a:defRPr sz="1800" kern="1200">
           <a:solidFill>
             <a:schemeClr val="tx1"/>
@@ -3038,7 +3562,7 @@
           <a:cs typeface="+mn-cs"/>
         </a:defRPr>
       </a:lvl4pPr>
-      <a:lvl5pPr marL="1828800" algn="l" defTabSz="457200" rtl="0" eaLnBrk="1" latinLnBrk="0" hangingPunct="1">
+      <a:lvl5pPr marL="1828800" algn="l" defTabSz="914400" rtl="0" eaLnBrk="1" latinLnBrk="0" hangingPunct="1">
         <a:defRPr sz="1800" kern="1200">
           <a:solidFill>
             <a:schemeClr val="tx1"/>
@@ -3048,7 +3572,7 @@
           <a:cs typeface="+mn-cs"/>
         </a:defRPr>
       </a:lvl5pPr>
-      <a:lvl6pPr marL="2286000" algn="l" defTabSz="457200" rtl="0" eaLnBrk="1" latinLnBrk="0" hangingPunct="1">
+      <a:lvl6pPr marL="2286000" algn="l" defTabSz="914400" rtl="0" eaLnBrk="1" latinLnBrk="0" hangingPunct="1">
         <a:defRPr sz="1800" kern="1200">
           <a:solidFill>
             <a:schemeClr val="tx1"/>
@@ -3058,7 +3582,7 @@
           <a:cs typeface="+mn-cs"/>
         </a:defRPr>
       </a:lvl6pPr>
-      <a:lvl7pPr marL="2743200" algn="l" defTabSz="457200" rtl="0" eaLnBrk="1" latinLnBrk="0" hangingPunct="1">
+      <a:lvl7pPr marL="2743200" algn="l" defTabSz="914400" rtl="0" eaLnBrk="1" latinLnBrk="0" hangingPunct="1">
         <a:defRPr sz="1800" kern="1200">
           <a:solidFill>
             <a:schemeClr val="tx1"/>
@@ -3068,7 +3592,7 @@
           <a:cs typeface="+mn-cs"/>
         </a:defRPr>
       </a:lvl7pPr>
-      <a:lvl8pPr marL="3200400" algn="l" defTabSz="457200" rtl="0" eaLnBrk="1" latinLnBrk="0" hangingPunct="1">
+      <a:lvl8pPr marL="3200400" algn="l" defTabSz="914400" rtl="0" eaLnBrk="1" latinLnBrk="0" hangingPunct="1">
         <a:defRPr sz="1800" kern="1200">
           <a:solidFill>
             <a:schemeClr val="tx1"/>
@@ -3078,7 +3602,7 @@
           <a:cs typeface="+mn-cs"/>
         </a:defRPr>
       </a:lvl8pPr>
-      <a:lvl9pPr marL="3657600" algn="l" defTabSz="457200" rtl="0" eaLnBrk="1" latinLnBrk="0" hangingPunct="1">
+      <a:lvl9pPr marL="3657600" algn="l" defTabSz="914400" rtl="0" eaLnBrk="1" latinLnBrk="0" hangingPunct="1">
         <a:defRPr sz="1800" kern="1200">
           <a:solidFill>
             <a:schemeClr val="tx1"/>
@@ -3119,7 +3643,7 @@
           <a:lstStyle/>
           <a:p>
             <a:r>
-              <a:t>Introduction to Object-Oriented Programming</a:t>
+              <a:t>Convolutional Neural Networks</a:t>
             </a:r>
           </a:p>
         </p:txBody>
@@ -3140,7 +3664,7 @@
           <a:lstStyle/>
           <a:p>
             <a:r>
-              <a:t>Understanding the Fundamentals of OOP</a:t>
+              <a:t>An Introduction to CNNs and Their Applications</a:t>
             </a:r>
           </a:p>
         </p:txBody>
@@ -3179,7 +3703,7 @@
           <a:lstStyle/>
           <a:p>
             <a:r>
-              <a:t>Advanced Concepts of Inheritance in OOP</a:t>
+              <a:t>Conclusion</a:t>
             </a:r>
           </a:p>
         </p:txBody>
@@ -3207,7 +3731,7 @@
             </a:pPr>
             <a:r>
               <a:rPr sz="1800"/>
-              <a:t>Inheritance in Object-Oriented Programming allows classes to inherit attributes and behaviors from parent classes.</a:t>
+              <a:t>CNNs have revolutionized the field of image recognition and continue to push the boundaries of what is possible in machine learning and artificial intelligence</a:t>
             </a:r>
           </a:p>
           <a:p>
@@ -3218,552 +3742,7 @@
             </a:pPr>
             <a:r>
               <a:rPr sz="1800"/>
-              <a:t>This promotes code reusability, as common functionality can be defined once in a parent class and reused in child classes.</a:t>
-            </a:r>
-          </a:p>
-          <a:p>
-            <a:pPr>
-              <a:spcAft>
-                <a:spcPts val="720"/>
-              </a:spcAft>
-            </a:pPr>
-            <a:r>
-              <a:rPr sz="1800"/>
-              <a:t>For example, in a hierarchy of classes representing vehicles, a base class 'Vehicle' can define common properties like 'color' and 'speed', which are inherited by subclasses like 'Car' and 'Truck'.</a:t>
-            </a:r>
-          </a:p>
-        </p:txBody>
-      </p:sp>
-    </p:spTree>
-  </p:cSld>
-  <p:clrMapOvr>
-    <a:masterClrMapping/>
-  </p:clrMapOvr>
-</p:sld>
-</file>
-
-<file path=ppt/slides/slide11.xml><?xml version="1.0" encoding="utf-8"?>
-<p:sld xmlns:a="http://schemas.openxmlformats.org/drawingml/2006/main" xmlns:p="http://schemas.openxmlformats.org/presentationml/2006/main" xmlns:r="http://schemas.openxmlformats.org/officeDocument/2006/relationships">
-  <p:cSld>
-    <p:spTree>
-      <p:nvGrpSpPr>
-        <p:cNvPr id="1" name=""/>
-        <p:cNvGrpSpPr/>
-        <p:nvPr/>
-      </p:nvGrpSpPr>
-      <p:grpSpPr/>
-      <p:sp>
-        <p:nvSpPr>
-          <p:cNvPr id="2" name="Title 1"/>
-          <p:cNvSpPr>
-            <a:spLocks noGrp="1"/>
-          </p:cNvSpPr>
-          <p:nvPr>
-            <p:ph type="title"/>
-          </p:nvPr>
-        </p:nvSpPr>
-        <p:spPr/>
-        <p:txBody>
-          <a:bodyPr/>
-          <a:lstStyle/>
-          <a:p>
-            <a:r>
-              <a:t>Challenges in Implementing Inheritance</a:t>
-            </a:r>
-          </a:p>
-        </p:txBody>
-      </p:sp>
-      <p:sp>
-        <p:nvSpPr>
-          <p:cNvPr id="3" name="Content Placeholder 2"/>
-          <p:cNvSpPr>
-            <a:spLocks noGrp="1"/>
-          </p:cNvSpPr>
-          <p:nvPr>
-            <p:ph idx="1"/>
-          </p:nvPr>
-        </p:nvSpPr>
-        <p:spPr/>
-        <p:txBody>
-          <a:bodyPr/>
-          <a:lstStyle/>
-          <a:p/>
-          <a:p>
-            <a:pPr>
-              <a:spcAft>
-                <a:spcPts val="720"/>
-              </a:spcAft>
-            </a:pPr>
-            <a:r>
-              <a:rPr sz="1800"/>
-              <a:t>While inheritance provides benefits such as code reuse and structure, it can introduce complexities and dependencies in the code.</a:t>
-            </a:r>
-          </a:p>
-          <a:p>
-            <a:pPr>
-              <a:spcAft>
-                <a:spcPts val="720"/>
-              </a:spcAft>
-            </a:pPr>
-            <a:r>
-              <a:rPr sz="1800"/>
-              <a:t>Deep class hierarchies can lead to issues like the 'diamond problem' where multiple inheritance causes conflicts in method resolution.</a:t>
-            </a:r>
-          </a:p>
-          <a:p>
-            <a:pPr>
-              <a:spcAft>
-                <a:spcPts val="720"/>
-              </a:spcAft>
-            </a:pPr>
-            <a:r>
-              <a:rPr sz="1800"/>
-              <a:t>Careful design and planning are necessary to ensure that inheritance relationships are logical and maintainable in the long term.</a:t>
-            </a:r>
-          </a:p>
-        </p:txBody>
-      </p:sp>
-    </p:spTree>
-  </p:cSld>
-  <p:clrMapOvr>
-    <a:masterClrMapping/>
-  </p:clrMapOvr>
-</p:sld>
-</file>
-
-<file path=ppt/slides/slide12.xml><?xml version="1.0" encoding="utf-8"?>
-<p:sld xmlns:a="http://schemas.openxmlformats.org/drawingml/2006/main" xmlns:p="http://schemas.openxmlformats.org/presentationml/2006/main" xmlns:r="http://schemas.openxmlformats.org/officeDocument/2006/relationships">
-  <p:cSld>
-    <p:spTree>
-      <p:nvGrpSpPr>
-        <p:cNvPr id="1" name=""/>
-        <p:cNvGrpSpPr/>
-        <p:nvPr/>
-      </p:nvGrpSpPr>
-      <p:grpSpPr/>
-      <p:sp>
-        <p:nvSpPr>
-          <p:cNvPr id="2" name="Title 1"/>
-          <p:cNvSpPr>
-            <a:spLocks noGrp="1"/>
-          </p:cNvSpPr>
-          <p:nvPr>
-            <p:ph type="title"/>
-          </p:nvPr>
-        </p:nvSpPr>
-        <p:spPr/>
-        <p:txBody>
-          <a:bodyPr/>
-          <a:lstStyle/>
-          <a:p>
-            <a:r>
-              <a:t>Best Practices for Inheritance</a:t>
-            </a:r>
-          </a:p>
-        </p:txBody>
-      </p:sp>
-      <p:sp>
-        <p:nvSpPr>
-          <p:cNvPr id="3" name="Content Placeholder 2"/>
-          <p:cNvSpPr>
-            <a:spLocks noGrp="1"/>
-          </p:cNvSpPr>
-          <p:nvPr>
-            <p:ph idx="1"/>
-          </p:nvPr>
-        </p:nvSpPr>
-        <p:spPr/>
-        <p:txBody>
-          <a:bodyPr/>
-          <a:lstStyle/>
-          <a:p/>
-          <a:p>
-            <a:pPr>
-              <a:spcAft>
-                <a:spcPts val="720"/>
-              </a:spcAft>
-            </a:pPr>
-            <a:r>
-              <a:rPr sz="1800"/>
-              <a:t>Avoid deep inheritance hierarchies to prevent complexity and confusion in the codebase.</a:t>
-            </a:r>
-          </a:p>
-          <a:p>
-            <a:pPr>
-              <a:spcAft>
-                <a:spcPts val="720"/>
-              </a:spcAft>
-            </a:pPr>
-            <a:r>
-              <a:rPr sz="1800"/>
-              <a:t>Prefer composition over inheritance when classes have a 'has-a' relationship rather than an 'is-a' relationship.</a:t>
-            </a:r>
-          </a:p>
-          <a:p>
-            <a:pPr>
-              <a:spcAft>
-                <a:spcPts val="720"/>
-              </a:spcAft>
-            </a:pPr>
-            <a:r>
-              <a:rPr sz="1800"/>
-              <a:t>Use interfaces or abstract classes to define common behavior without the constraints of single inheritance.</a:t>
-            </a:r>
-          </a:p>
-        </p:txBody>
-      </p:sp>
-    </p:spTree>
-  </p:cSld>
-  <p:clrMapOvr>
-    <a:masterClrMapping/>
-  </p:clrMapOvr>
-</p:sld>
-</file>
-
-<file path=ppt/slides/slide13.xml><?xml version="1.0" encoding="utf-8"?>
-<p:sld xmlns:a="http://schemas.openxmlformats.org/drawingml/2006/main" xmlns:p="http://schemas.openxmlformats.org/presentationml/2006/main" xmlns:r="http://schemas.openxmlformats.org/officeDocument/2006/relationships">
-  <p:cSld>
-    <p:spTree>
-      <p:nvGrpSpPr>
-        <p:cNvPr id="1" name=""/>
-        <p:cNvGrpSpPr/>
-        <p:nvPr/>
-      </p:nvGrpSpPr>
-      <p:grpSpPr/>
-      <p:sp>
-        <p:nvSpPr>
-          <p:cNvPr id="2" name="Title 1"/>
-          <p:cNvSpPr>
-            <a:spLocks noGrp="1"/>
-          </p:cNvSpPr>
-          <p:nvPr>
-            <p:ph type="title"/>
-          </p:nvPr>
-        </p:nvSpPr>
-        <p:spPr/>
-        <p:txBody>
-          <a:bodyPr/>
-          <a:lstStyle/>
-          <a:p>
-            <a:r>
-              <a:t>Real-World Examples of Inheritance in Applications</a:t>
-            </a:r>
-          </a:p>
-        </p:txBody>
-      </p:sp>
-      <p:sp>
-        <p:nvSpPr>
-          <p:cNvPr id="3" name="Content Placeholder 2"/>
-          <p:cNvSpPr>
-            <a:spLocks noGrp="1"/>
-          </p:cNvSpPr>
-          <p:nvPr>
-            <p:ph idx="1"/>
-          </p:nvPr>
-        </p:nvSpPr>
-        <p:spPr/>
-        <p:txBody>
-          <a:bodyPr/>
-          <a:lstStyle/>
-          <a:p/>
-          <a:p>
-            <a:pPr>
-              <a:spcAft>
-                <a:spcPts val="720"/>
-              </a:spcAft>
-            </a:pPr>
-            <a:r>
-              <a:rPr sz="1800"/>
-              <a:t>Inheritance is commonly used in software development to model relationships between entities and promote code reuse.</a:t>
-            </a:r>
-          </a:p>
-          <a:p>
-            <a:pPr>
-              <a:spcAft>
-                <a:spcPts val="720"/>
-              </a:spcAft>
-            </a:pPr>
-            <a:r>
-              <a:rPr sz="1800"/>
-              <a:t>For instance, in a banking application, different account types like 'SavingsAccount' and 'CheckingAccount' can inherit common properties from a base 'Account' class.</a:t>
-            </a:r>
-          </a:p>
-          <a:p>
-            <a:pPr>
-              <a:spcAft>
-                <a:spcPts val="720"/>
-              </a:spcAft>
-            </a:pPr>
-            <a:r>
-              <a:rPr sz="1800"/>
-              <a:t>This allows for consistent behavior across account types while enabling specific functionality in each subclass.</a:t>
-            </a:r>
-          </a:p>
-        </p:txBody>
-      </p:sp>
-    </p:spTree>
-  </p:cSld>
-  <p:clrMapOvr>
-    <a:masterClrMapping/>
-  </p:clrMapOvr>
-</p:sld>
-</file>
-
-<file path=ppt/slides/slide14.xml><?xml version="1.0" encoding="utf-8"?>
-<p:sld xmlns:a="http://schemas.openxmlformats.org/drawingml/2006/main" xmlns:p="http://schemas.openxmlformats.org/presentationml/2006/main" xmlns:r="http://schemas.openxmlformats.org/officeDocument/2006/relationships">
-  <p:cSld>
-    <p:spTree>
-      <p:nvGrpSpPr>
-        <p:cNvPr id="1" name=""/>
-        <p:cNvGrpSpPr/>
-        <p:nvPr/>
-      </p:nvGrpSpPr>
-      <p:grpSpPr/>
-      <p:sp>
-        <p:nvSpPr>
-          <p:cNvPr id="2" name="Title 1"/>
-          <p:cNvSpPr>
-            <a:spLocks noGrp="1"/>
-          </p:cNvSpPr>
-          <p:nvPr>
-            <p:ph type="title"/>
-          </p:nvPr>
-        </p:nvSpPr>
-        <p:spPr/>
-        <p:txBody>
-          <a:bodyPr/>
-          <a:lstStyle/>
-          <a:p>
-            <a:r>
-              <a:t>Conclusion on the Significance of Inheritance</a:t>
-            </a:r>
-          </a:p>
-        </p:txBody>
-      </p:sp>
-      <p:sp>
-        <p:nvSpPr>
-          <p:cNvPr id="3" name="Content Placeholder 2"/>
-          <p:cNvSpPr>
-            <a:spLocks noGrp="1"/>
-          </p:cNvSpPr>
-          <p:nvPr>
-            <p:ph idx="1"/>
-          </p:nvPr>
-        </p:nvSpPr>
-        <p:spPr/>
-        <p:txBody>
-          <a:bodyPr/>
-          <a:lstStyle/>
-          <a:p/>
-          <a:p>
-            <a:pPr>
-              <a:spcAft>
-                <a:spcPts val="720"/>
-              </a:spcAft>
-            </a:pPr>
-            <a:r>
-              <a:rPr sz="1800"/>
-              <a:t>The concept of inheritance plays a crucial role in shaping the structure and design of software systems.</a:t>
-            </a:r>
-          </a:p>
-          <a:p>
-            <a:pPr>
-              <a:spcAft>
-                <a:spcPts val="720"/>
-              </a:spcAft>
-            </a:pPr>
-            <a:r>
-              <a:rPr sz="1800"/>
-              <a:t>By fostering code reusability, hierarchy, and extensibility, inheritance contributes to the development of maintainable and scalable applications.</a:t>
-            </a:r>
-          </a:p>
-          <a:p>
-            <a:pPr>
-              <a:spcAft>
-                <a:spcPts val="720"/>
-              </a:spcAft>
-            </a:pPr>
-            <a:r>
-              <a:rPr sz="1800"/>
-              <a:t>Understanding and effectively implementing inheritance is essential for software engineers to create robust and efficient software solutions.</a:t>
-            </a:r>
-          </a:p>
-        </p:txBody>
-      </p:sp>
-    </p:spTree>
-  </p:cSld>
-  <p:clrMapOvr>
-    <a:masterClrMapping/>
-  </p:clrMapOvr>
-</p:sld>
-</file>
-
-<file path=ppt/slides/slide15.xml><?xml version="1.0" encoding="utf-8"?>
-<p:sld xmlns:a="http://schemas.openxmlformats.org/drawingml/2006/main" xmlns:p="http://schemas.openxmlformats.org/presentationml/2006/main" xmlns:r="http://schemas.openxmlformats.org/officeDocument/2006/relationships">
-  <p:cSld>
-    <p:spTree>
-      <p:nvGrpSpPr>
-        <p:cNvPr id="1" name=""/>
-        <p:cNvGrpSpPr/>
-        <p:nvPr/>
-      </p:nvGrpSpPr>
-      <p:grpSpPr/>
-      <p:sp>
-        <p:nvSpPr>
-          <p:cNvPr id="2" name="Title 1"/>
-          <p:cNvSpPr>
-            <a:spLocks noGrp="1"/>
-          </p:cNvSpPr>
-          <p:nvPr>
-            <p:ph type="title"/>
-          </p:nvPr>
-        </p:nvSpPr>
-        <p:spPr/>
-        <p:txBody>
-          <a:bodyPr/>
-          <a:lstStyle/>
-          <a:p>
-            <a:r>
-              <a:t>References</a:t>
-            </a:r>
-          </a:p>
-        </p:txBody>
-      </p:sp>
-      <p:sp>
-        <p:nvSpPr>
-          <p:cNvPr id="3" name="Content Placeholder 2"/>
-          <p:cNvSpPr>
-            <a:spLocks noGrp="1"/>
-          </p:cNvSpPr>
-          <p:nvPr>
-            <p:ph idx="1"/>
-          </p:nvPr>
-        </p:nvSpPr>
-        <p:spPr/>
-        <p:txBody>
-          <a:bodyPr/>
-          <a:lstStyle/>
-          <a:p/>
-          <a:p>
-            <a:pPr>
-              <a:spcAft>
-                <a:spcPts val="720"/>
-              </a:spcAft>
-            </a:pPr>
-            <a:r>
-              <a:rPr sz="1800"/>
-              <a:t>1. Deitel, P., &amp; Deitel, H. (2009). Java: How to Program (8th ed.). Pearson Education, Inc.</a:t>
-            </a:r>
-          </a:p>
-          <a:p>
-            <a:pPr>
-              <a:spcAft>
-                <a:spcPts val="720"/>
-              </a:spcAft>
-            </a:pPr>
-            <a:r>
-              <a:rPr sz="1800"/>
-              <a:t>2. Eckel, B. (2006). Thinking in Java (4th ed.). Prentice Hall.</a:t>
-            </a:r>
-          </a:p>
-          <a:p>
-            <a:pPr>
-              <a:spcAft>
-                <a:spcPts val="720"/>
-              </a:spcAft>
-            </a:pPr>
-            <a:r>
-              <a:rPr sz="1800"/>
-              <a:t>3. Lethbridge, T., &amp; Laganière, R. (2005). Object-Oriented Software Engineering: Practical Software Development Using UML and Java, 2nd Edition. McGraw-Hill.</a:t>
-            </a:r>
-          </a:p>
-        </p:txBody>
-      </p:sp>
-    </p:spTree>
-  </p:cSld>
-  <p:clrMapOvr>
-    <a:masterClrMapping/>
-  </p:clrMapOvr>
-</p:sld>
-</file>
-
-<file path=ppt/slides/slide16.xml><?xml version="1.0" encoding="utf-8"?>
-<p:sld xmlns:a="http://schemas.openxmlformats.org/drawingml/2006/main" xmlns:p="http://schemas.openxmlformats.org/presentationml/2006/main" xmlns:r="http://schemas.openxmlformats.org/officeDocument/2006/relationships">
-  <p:cSld>
-    <p:spTree>
-      <p:nvGrpSpPr>
-        <p:cNvPr id="1" name=""/>
-        <p:cNvGrpSpPr/>
-        <p:nvPr/>
-      </p:nvGrpSpPr>
-      <p:grpSpPr/>
-      <p:sp>
-        <p:nvSpPr>
-          <p:cNvPr id="2" name="Title 1"/>
-          <p:cNvSpPr>
-            <a:spLocks noGrp="1"/>
-          </p:cNvSpPr>
-          <p:nvPr>
-            <p:ph type="title"/>
-          </p:nvPr>
-        </p:nvSpPr>
-        <p:spPr/>
-        <p:txBody>
-          <a:bodyPr/>
-          <a:lstStyle/>
-          <a:p>
-            <a:r>
-              <a:t>Thank You</a:t>
-            </a:r>
-          </a:p>
-        </p:txBody>
-      </p:sp>
-      <p:sp>
-        <p:nvSpPr>
-          <p:cNvPr id="3" name="Content Placeholder 2"/>
-          <p:cNvSpPr>
-            <a:spLocks noGrp="1"/>
-          </p:cNvSpPr>
-          <p:nvPr>
-            <p:ph idx="1"/>
-          </p:nvPr>
-        </p:nvSpPr>
-        <p:spPr/>
-        <p:txBody>
-          <a:bodyPr/>
-          <a:lstStyle/>
-          <a:p/>
-          <a:p>
-            <a:pPr>
-              <a:spcAft>
-                <a:spcPts val="720"/>
-              </a:spcAft>
-            </a:pPr>
-            <a:r>
-              <a:rPr sz="1800"/>
-              <a:t>Thank you for exploring the concepts of Object-Oriented Programming and Inheritance!</a:t>
-            </a:r>
-          </a:p>
-          <a:p>
-            <a:pPr>
-              <a:spcAft>
-                <a:spcPts val="720"/>
-              </a:spcAft>
-            </a:pPr>
-            <a:r>
-              <a:rPr sz="1800"/>
-              <a:t>Feel free to ask any further questions about OOP and inheritance.</a:t>
-            </a:r>
-          </a:p>
-          <a:p>
-            <a:pPr>
-              <a:spcAft>
-                <a:spcPts val="720"/>
-              </a:spcAft>
-            </a:pPr>
-            <a:r>
-              <a:rPr sz="1800"/>
-              <a:t>Hope you found the presentation insightful and helpful!</a:t>
+              <a:t>Ongoing research and development promise to further expand their capabilities and applications</a:t>
             </a:r>
           </a:p>
         </p:txBody>
@@ -3802,7 +3781,7 @@
           <a:lstStyle/>
           <a:p>
             <a:r>
-              <a:t>What is OOP?</a:t>
+              <a:t>What are Convolutional Neural Networks?</a:t>
             </a:r>
           </a:p>
         </p:txBody>
@@ -3830,7 +3809,7 @@
             </a:pPr>
             <a:r>
               <a:rPr sz="1800"/>
-              <a:t>Object-Oriented Programming (OOP) is a programming paradigm that uses objects to design applications and computer programs.</a:t>
+              <a:t>Convolutional Neural Networks (CNNs) are a class of deep neural networks most commonly applied to analyzing visual imagery</a:t>
             </a:r>
           </a:p>
           <a:p>
@@ -3841,7 +3820,7 @@
             </a:pPr>
             <a:r>
               <a:rPr sz="1800"/>
-              <a:t>In OOP, objects are instances of classes that encapsulate data and behavior, allowing for modular and reusable code.</a:t>
+              <a:t>They are specifically designed to process pixel data and are used in image recognition and classification challenges</a:t>
             </a:r>
           </a:p>
           <a:p>
@@ -3852,7 +3831,7 @@
             </a:pPr>
             <a:r>
               <a:rPr sz="1800"/>
-              <a:t>OOP focuses on concepts such as abstraction, encapsulation, inheritance, and polymorphism to organize code and improve software design.</a:t>
+              <a:t>CNNs use a series of convolutional layers to filter inputs for useful information</a:t>
             </a:r>
           </a:p>
         </p:txBody>
@@ -3891,7 +3870,7 @@
           <a:lstStyle/>
           <a:p>
             <a:r>
-              <a:t>Key Concepts of OOP</a:t>
+              <a:t>Architecture of CNNs</a:t>
             </a:r>
           </a:p>
         </p:txBody>
@@ -3903,7 +3882,7 @@
             <a:spLocks noGrp="1"/>
           </p:cNvSpPr>
           <p:nvPr>
-            <p:ph idx="1"/>
+            <p:ph idx="1" sz="half"/>
           </p:nvPr>
         </p:nvSpPr>
         <p:spPr/>
@@ -3919,7 +3898,7 @@
             </a:pPr>
             <a:r>
               <a:rPr sz="1800"/>
-              <a:t>Abstraction allows programmers to hide complex implementation details and only show the necessary features of an object.</a:t>
+              <a:t>The architecture of a CNN includes layers like convolutional layers, pooling layers, and fully connected layers</a:t>
             </a:r>
           </a:p>
           <a:p>
@@ -3930,22 +3909,30 @@
             </a:pPr>
             <a:r>
               <a:rPr sz="1800"/>
-              <a:t>Encapsulation combines data and methods into a single unit, protecting data from outside interference and misuse.</a:t>
-            </a:r>
-          </a:p>
-          <a:p>
-            <a:pPr>
-              <a:spcAft>
-                <a:spcPts val="720"/>
-              </a:spcAft>
-            </a:pPr>
-            <a:r>
-              <a:rPr sz="1800"/>
-              <a:t>Inheritance enables new classes to inherit attributes and methods from existing classes, promoting code reusability and hierarchy.</a:t>
-            </a:r>
-          </a:p>
-        </p:txBody>
-      </p:sp>
+              <a:t>Each layer performs distinct operations on the input data to capture and represent the features effectively</a:t>
+            </a:r>
+          </a:p>
+        </p:txBody>
+      </p:sp>
+      <p:pic>
+        <p:nvPicPr>
+          <p:cNvPr id="4" name="Content Placeholder 3" descr="downloaded_image_0.png"/>
+          <p:cNvPicPr>
+            <a:picLocks noGrp="1" noChangeAspect="1"/>
+          </p:cNvPicPr>
+          <p:nvPr>
+            <p:ph idx="2" sz="half"/>
+          </p:nvPr>
+        </p:nvPicPr>
+        <p:blipFill>
+          <a:blip r:embed="rId2"/>
+          <a:srcRect t="12956" b="12956"/>
+          <a:stretch>
+            <a:fillRect/>
+          </a:stretch>
+        </p:blipFill>
+        <p:spPr/>
+      </p:pic>
     </p:spTree>
   </p:cSld>
   <p:clrMapOvr>
@@ -3980,7 +3967,7 @@
           <a:lstStyle/>
           <a:p>
             <a:r>
-              <a:t>Classes and Objects in OOP</a:t>
+              <a:t>Convolutional Layers</a:t>
             </a:r>
           </a:p>
         </p:txBody>
@@ -3992,7 +3979,7 @@
             <a:spLocks noGrp="1"/>
           </p:cNvSpPr>
           <p:nvPr>
-            <p:ph idx="1" sz="half"/>
+            <p:ph idx="1"/>
           </p:nvPr>
         </p:nvSpPr>
         <p:spPr/>
@@ -4008,7 +3995,7 @@
             </a:pPr>
             <a:r>
               <a:rPr sz="1800"/>
-              <a:t>Classes are blueprints for creating objects, defining their structure and behavior.</a:t>
+              <a:t>Convolutional masks use filters to perform convolution operations</a:t>
             </a:r>
           </a:p>
           <a:p>
@@ -4019,7 +4006,7 @@
             </a:pPr>
             <a:r>
               <a:rPr sz="1800"/>
-              <a:t>Objects are instances of classes, representing real-world entities with attributes (data) and methods (behavior).</a:t>
+              <a:t>This operation extracts high-level features such as edges from the input image</a:t>
             </a:r>
           </a:p>
           <a:p>
@@ -4030,58 +4017,11 @@
             </a:pPr>
             <a:r>
               <a:rPr sz="1800"/>
-              <a:t>Inheritance allows classes to inherit characteristics from a parent class, promoting code reusability and modularity.</a:t>
-            </a:r>
-          </a:p>
-        </p:txBody>
-      </p:sp>
-      <p:sp>
-        <p:nvSpPr>
-          <p:cNvPr id="4" name="Content Placeholder 3"/>
-          <p:cNvSpPr>
-            <a:spLocks noGrp="1"/>
-          </p:cNvSpPr>
-          <p:nvPr>
-            <p:ph idx="2" sz="half"/>
-          </p:nvPr>
-        </p:nvSpPr>
-        <p:spPr/>
-        <p:txBody>
-          <a:bodyPr/>
-          <a:lstStyle/>
-          <a:p/>
-          <a:p>
-            <a:r>
-              <a:rPr sz="1800"/>
-              <a:t>Class and Object Diagram</a:t>
-            </a:r>
-          </a:p>
-        </p:txBody>
-      </p:sp>
-      <p:pic>
-        <p:nvPicPr>
-          <p:cNvPr id="5" name="Picture 4" descr="downloaded_image_0.png"/>
-          <p:cNvPicPr>
-            <a:picLocks noChangeAspect="1"/>
-          </p:cNvPicPr>
-          <p:nvPr/>
-        </p:nvPicPr>
-        <p:blipFill>
-          <a:blip r:embed="rId2"/>
-          <a:stretch>
-            <a:fillRect/>
-          </a:stretch>
-        </p:blipFill>
-        <p:spPr>
-          <a:xfrm>
-            <a:off x="5029200" y="2743200"/>
-            <a:ext cx="3657600" cy="3657600"/>
-          </a:xfrm>
-          <a:prstGeom prst="rect">
-            <a:avLst/>
-          </a:prstGeom>
-        </p:spPr>
-      </p:pic>
+              <a:t>Filters are adjusted during the learning process to capture the most relevant features</a:t>
+            </a:r>
+          </a:p>
+        </p:txBody>
+      </p:sp>
     </p:spTree>
   </p:cSld>
   <p:clrMapOvr>
@@ -4116,7 +4056,7 @@
           <a:lstStyle/>
           <a:p>
             <a:r>
-              <a:t>Polymorphism in OOP</a:t>
+              <a:t>Pooling Layers</a:t>
             </a:r>
           </a:p>
         </p:txBody>
@@ -4144,7 +4084,7 @@
             </a:pPr>
             <a:r>
               <a:rPr sz="1800"/>
-              <a:t>Polymorphism enables objects to be treated as instances of their parent class, allowing for flexibility and dynamic behavior at runtime.</a:t>
+              <a:t>Pooling layers reduce the spatial size of the representation to reduce the number of parameters and computation in the network</a:t>
             </a:r>
           </a:p>
           <a:p>
@@ -4155,18 +4095,7 @@
             </a:pPr>
             <a:r>
               <a:rPr sz="1800"/>
-              <a:t>Method overloading and method overriding are common examples of polymorphism in OOP, providing different implementations of the same method.</a:t>
-            </a:r>
-          </a:p>
-          <a:p>
-            <a:pPr>
-              <a:spcAft>
-                <a:spcPts val="720"/>
-              </a:spcAft>
-            </a:pPr>
-            <a:r>
-              <a:rPr sz="1800"/>
-              <a:t>Polymorphism simplifies code maintenance and promotes code reusability by facilitating flexibility and extensibility.</a:t>
+              <a:t>The most common type of pooling is max pooling, which selects the maximum value from each sub-region of the feature map</a:t>
             </a:r>
           </a:p>
         </p:txBody>
@@ -4205,7 +4134,7 @@
           <a:lstStyle/>
           <a:p>
             <a:r>
-              <a:t>Benefits of OOP</a:t>
+              <a:t>Fully Connected Layers</a:t>
             </a:r>
           </a:p>
         </p:txBody>
@@ -4233,7 +4162,7 @@
             </a:pPr>
             <a:r>
               <a:rPr sz="1800"/>
-              <a:t>OOP promotes code reusability, modularity, and flexibility, making it easier to maintain and update software.</a:t>
+              <a:t>After several convolutional and pooling layers, the high-level reasoning in the neural network is done via fully connected layers</a:t>
             </a:r>
           </a:p>
           <a:p>
@@ -4244,18 +4173,7 @@
             </a:pPr>
             <a:r>
               <a:rPr sz="1800"/>
-              <a:t>Encapsulation enhances data security and reduces system complexity by hiding implementation details.</a:t>
-            </a:r>
-          </a:p>
-          <a:p>
-            <a:pPr>
-              <a:spcAft>
-                <a:spcPts val="720"/>
-              </a:spcAft>
-            </a:pPr>
-            <a:r>
-              <a:rPr sz="1800"/>
-              <a:t>Inheritance simplifies code structure and promotes hierarchical relationships between classes, improving software design.</a:t>
+              <a:t>Neurons in a fully connected layer have full connections to all activations in the previous layer</a:t>
             </a:r>
           </a:p>
         </p:txBody>
@@ -4294,7 +4212,7 @@
           <a:lstStyle/>
           <a:p>
             <a:r>
-              <a:t>Challenges in OOP</a:t>
+              <a:t>Applications of CNNs</a:t>
             </a:r>
           </a:p>
         </p:txBody>
@@ -4322,7 +4240,7 @@
             </a:pPr>
             <a:r>
               <a:rPr sz="1800"/>
-              <a:t>Complexity in class hierarchies and relationships can lead to difficulties in understanding and maintaining OOP code.</a:t>
+              <a:t>CNNs are widely used in image and video recognition, image classification, medical image analysis, and natural language processing</a:t>
             </a:r>
           </a:p>
           <a:p>
@@ -4333,18 +4251,7 @@
             </a:pPr>
             <a:r>
               <a:rPr sz="1800"/>
-              <a:t>Overuse of inheritance can result in tightly coupled classes, making code modification and extension challenging.</a:t>
-            </a:r>
-          </a:p>
-          <a:p>
-            <a:pPr>
-              <a:spcAft>
-                <a:spcPts val="720"/>
-              </a:spcAft>
-            </a:pPr>
-            <a:r>
-              <a:rPr sz="1800"/>
-              <a:t>Proper design patterns and principles such as SOLID (Single Responsibility, Open/Closed, Liskov Substitution, Interface Segregation, Dependency Inversion) can help address these challenges.</a:t>
+              <a:t>They also play a crucial role in the development of autonomous vehicles by enabling them to recognize obstacles</a:t>
             </a:r>
           </a:p>
         </p:txBody>
@@ -4383,7 +4290,7 @@
           <a:lstStyle/>
           <a:p>
             <a:r>
-              <a:t>Real-World Examples of OOP</a:t>
+              <a:t>Advancements in CNNs</a:t>
             </a:r>
           </a:p>
         </p:txBody>
@@ -4411,7 +4318,7 @@
             </a:pPr>
             <a:r>
               <a:rPr sz="1800"/>
-              <a:t>Software applications like web browsers, graphic design tools, and word processors are often developed using OOP principles.</a:t>
+              <a:t>Research in CNN architectures has led to the development of deeper and more complex networks capable of achieving state-of-the-art performance on various tasks</a:t>
             </a:r>
           </a:p>
           <a:p>
@@ -4422,18 +4329,7 @@
             </a:pPr>
             <a:r>
               <a:rPr sz="1800"/>
-              <a:t>Game development, financial modeling, and enterprise software systems also leverage OOP for creating scalable and maintainable solutions.</a:t>
-            </a:r>
-          </a:p>
-          <a:p>
-            <a:pPr>
-              <a:spcAft>
-                <a:spcPts val="720"/>
-              </a:spcAft>
-            </a:pPr>
-            <a:r>
-              <a:rPr sz="1800"/>
-              <a:t>Popular programming languages such as Java, C++, and Python support OOP features to facilitate software development.</a:t>
+              <a:t>New advancements focus on making CNNs more efficient, requiring less computational power and data</a:t>
             </a:r>
           </a:p>
         </p:txBody>
@@ -4472,7 +4368,7 @@
           <a:lstStyle/>
           <a:p>
             <a:r>
-              <a:t>Conclusion</a:t>
+              <a:t>Challenges in CNN Development</a:t>
             </a:r>
           </a:p>
         </p:txBody>
@@ -4484,7 +4380,7 @@
             <a:spLocks noGrp="1"/>
           </p:cNvSpPr>
           <p:nvPr>
-            <p:ph idx="1"/>
+            <p:ph idx="1" sz="half"/>
           </p:nvPr>
         </p:nvSpPr>
         <p:spPr/>
@@ -4500,7 +4396,7 @@
             </a:pPr>
             <a:r>
               <a:rPr sz="1800"/>
-              <a:t>In conclusion, Object-Oriented Programming provides a powerful framework for developing software systems by focusing on objects and classes.</a:t>
+              <a:t>Despite their success, CNNs face challenges such as overfitting to training data</a:t>
             </a:r>
           </a:p>
           <a:p>
@@ -4511,22 +4407,30 @@
             </a:pPr>
             <a:r>
               <a:rPr sz="1800"/>
-              <a:t>By incorporating key concepts such as inheritance, encapsulation, and polymorphism, OOP promotes code reusability and modularity.</a:t>
-            </a:r>
-          </a:p>
-          <a:p>
-            <a:pPr>
-              <a:spcAft>
-                <a:spcPts val="720"/>
-              </a:spcAft>
-            </a:pPr>
-            <a:r>
-              <a:rPr sz="1800"/>
-              <a:t>As software complexity grows, OOP remains a valuable approach for creating scalable, maintainable, and efficient applications.</a:t>
-            </a:r>
-          </a:p>
-        </p:txBody>
-      </p:sp>
+              <a:t>They also require significant computational resources, which can be a barrier to entry for smaller organizations</a:t>
+            </a:r>
+          </a:p>
+        </p:txBody>
+      </p:sp>
+      <p:pic>
+        <p:nvPicPr>
+          <p:cNvPr id="4" name="Content Placeholder 3" descr="downloaded_image_1.png"/>
+          <p:cNvPicPr>
+            <a:picLocks noGrp="1" noChangeAspect="1"/>
+          </p:cNvPicPr>
+          <p:nvPr>
+            <p:ph idx="2" sz="half"/>
+          </p:nvPr>
+        </p:nvPicPr>
+        <p:blipFill>
+          <a:blip r:embed="rId2"/>
+          <a:srcRect t="12956" b="12956"/>
+          <a:stretch>
+            <a:fillRect/>
+          </a:stretch>
+        </p:blipFill>
+        <p:spPr/>
+      </p:pic>
     </p:spTree>
   </p:cSld>
   <p:clrMapOvr>
@@ -4536,9 +4440,9 @@
 </file>
 
 <file path=ppt/theme/theme1.xml><?xml version="1.0" encoding="utf-8"?>
-<a:theme xmlns:a="http://schemas.openxmlformats.org/drawingml/2006/main" name="Office Theme">
+<a:theme xmlns:a="http://schemas.openxmlformats.org/drawingml/2006/main" name="Gallery">
   <a:themeElements>
-    <a:clrScheme name="Office">
+    <a:clrScheme name="Gallery">
       <a:dk1>
         <a:sysClr val="windowText" lastClr="000000"/>
       </a:dk1>
@@ -4546,44 +4450,44 @@
         <a:sysClr val="window" lastClr="FFFFFF"/>
       </a:lt1>
       <a:dk2>
-        <a:srgbClr val="1F497D"/>
+        <a:srgbClr val="454545"/>
       </a:dk2>
       <a:lt2>
-        <a:srgbClr val="EEECE1"/>
+        <a:srgbClr val="DFDBD5"/>
       </a:lt2>
       <a:accent1>
-        <a:srgbClr val="4F81BD"/>
+        <a:srgbClr val="B71E42"/>
       </a:accent1>
       <a:accent2>
-        <a:srgbClr val="C0504D"/>
+        <a:srgbClr val="DE478E"/>
       </a:accent2>
       <a:accent3>
-        <a:srgbClr val="9BBB59"/>
+        <a:srgbClr val="BC72F0"/>
       </a:accent3>
       <a:accent4>
-        <a:srgbClr val="8064A2"/>
+        <a:srgbClr val="795FAF"/>
       </a:accent4>
       <a:accent5>
-        <a:srgbClr val="4BACC6"/>
+        <a:srgbClr val="586EA6"/>
       </a:accent5>
       <a:accent6>
-        <a:srgbClr val="F79646"/>
+        <a:srgbClr val="6892A0"/>
       </a:accent6>
       <a:hlink>
-        <a:srgbClr val="0000FF"/>
+        <a:srgbClr val="FA2B5C"/>
       </a:hlink>
       <a:folHlink>
-        <a:srgbClr val="800080"/>
+        <a:srgbClr val="BC658E"/>
       </a:folHlink>
     </a:clrScheme>
-    <a:fontScheme name="Office">
+    <a:fontScheme name="Gallery">
       <a:majorFont>
-        <a:latin typeface="Calibri"/>
+        <a:latin typeface="Gill Sans MT" panose="020B0502020104020203"/>
         <a:ea typeface=""/>
         <a:cs typeface=""/>
-        <a:font script="Jpan" typeface="ＭＳ Ｐゴシック"/>
+        <a:font script="Jpan" typeface="游ゴシック Light"/>
         <a:font script="Hang" typeface="맑은 고딕"/>
-        <a:font script="Hans" typeface="宋体"/>
+        <a:font script="Hans" typeface="等线 Light"/>
         <a:font script="Hant" typeface="新細明體"/>
         <a:font script="Arab" typeface="Times New Roman"/>
         <a:font script="Hebr" typeface="Times New Roman"/>
@@ -4613,12 +4517,12 @@
         <a:font script="Geor" typeface="Sylfaen"/>
       </a:majorFont>
       <a:minorFont>
-        <a:latin typeface="Calibri"/>
+        <a:latin typeface="Gill Sans MT" panose="020B0502020104020203"/>
         <a:ea typeface=""/>
         <a:cs typeface=""/>
-        <a:font script="Jpan" typeface="ＭＳ Ｐゴシック"/>
+        <a:font script="Jpan" typeface="游ゴシック"/>
         <a:font script="Hang" typeface="맑은 고딕"/>
-        <a:font script="Hans" typeface="宋体"/>
+        <a:font script="Hans" typeface="等线"/>
         <a:font script="Hant" typeface="新細明體"/>
         <a:font script="Arab" typeface="Arial"/>
         <a:font script="Hebr" typeface="Arial"/>
@@ -4648,7 +4552,7 @@
         <a:font script="Geor" typeface="Sylfaen"/>
       </a:minorFont>
     </a:fontScheme>
-    <a:fmtScheme name="Office">
+    <a:fmtScheme name="Gallery">
       <a:fillStyleLst>
         <a:solidFill>
           <a:schemeClr val="phClr"/>
@@ -4657,62 +4561,64 @@
           <a:gsLst>
             <a:gs pos="0">
               <a:schemeClr val="phClr">
-                <a:tint val="50000"/>
-                <a:satMod val="300000"/>
-              </a:schemeClr>
-            </a:gs>
-            <a:gs pos="35000">
-              <a:schemeClr val="phClr">
-                <a:tint val="37000"/>
-                <a:satMod val="300000"/>
+                <a:tint val="54000"/>
+                <a:alpha val="100000"/>
+                <a:satMod val="105000"/>
+                <a:lumMod val="110000"/>
               </a:schemeClr>
             </a:gs>
             <a:gs pos="100000">
               <a:schemeClr val="phClr">
-                <a:tint val="15000"/>
-                <a:satMod val="350000"/>
+                <a:tint val="78000"/>
+                <a:alpha val="92000"/>
+                <a:satMod val="109000"/>
+                <a:lumMod val="100000"/>
               </a:schemeClr>
             </a:gs>
           </a:gsLst>
-          <a:lin ang="16200000" scaled="1"/>
+          <a:lin ang="5400000" scaled="0"/>
         </a:gradFill>
         <a:gradFill rotWithShape="1">
           <a:gsLst>
             <a:gs pos="0">
               <a:schemeClr val="phClr">
-                <a:tint val="100000"/>
-                <a:shade val="100000"/>
+                <a:tint val="98000"/>
+                <a:satMod val="110000"/>
+                <a:lumMod val="104000"/>
+              </a:schemeClr>
+            </a:gs>
+            <a:gs pos="69000">
+              <a:schemeClr val="phClr">
+                <a:shade val="88000"/>
                 <a:satMod val="130000"/>
+                <a:lumMod val="92000"/>
               </a:schemeClr>
             </a:gs>
             <a:gs pos="100000">
               <a:schemeClr val="phClr">
-                <a:tint val="50000"/>
-                <a:shade val="100000"/>
-                <a:satMod val="350000"/>
+                <a:shade val="78000"/>
+                <a:satMod val="130000"/>
+                <a:lumMod val="92000"/>
               </a:schemeClr>
             </a:gs>
           </a:gsLst>
-          <a:lin ang="16200000" scaled="0"/>
+          <a:lin ang="5400000" scaled="0"/>
         </a:gradFill>
       </a:fillStyleLst>
       <a:lnStyleLst>
         <a:ln w="9525" cap="flat" cmpd="sng" algn="ctr">
           <a:solidFill>
-            <a:schemeClr val="phClr">
-              <a:shade val="95000"/>
-              <a:satMod val="105000"/>
-            </a:schemeClr>
+            <a:schemeClr val="phClr"/>
           </a:solidFill>
           <a:prstDash val="solid"/>
         </a:ln>
-        <a:ln w="25400" cap="flat" cmpd="sng" algn="ctr">
+        <a:ln w="15875" cap="flat" cmpd="sng" algn="ctr">
           <a:solidFill>
             <a:schemeClr val="phClr"/>
           </a:solidFill>
           <a:prstDash val="solid"/>
         </a:ln>
-        <a:ln w="38100" cap="flat" cmpd="sng" algn="ctr">
+        <a:ln w="22225" cap="flat" cmpd="sng" algn="ctr">
           <a:solidFill>
             <a:schemeClr val="phClr"/>
           </a:solidFill>
@@ -4721,28 +4627,16 @@
       </a:lnStyleLst>
       <a:effectStyleLst>
         <a:effectStyle>
-          <a:effectLst>
-            <a:outerShdw blurRad="40000" dist="20000" dir="5400000" rotWithShape="0">
-              <a:srgbClr val="000000">
-                <a:alpha val="38000"/>
-              </a:srgbClr>
-            </a:outerShdw>
-          </a:effectLst>
+          <a:effectLst/>
+        </a:effectStyle>
+        <a:effectStyle>
+          <a:effectLst/>
         </a:effectStyle>
         <a:effectStyle>
           <a:effectLst>
-            <a:outerShdw blurRad="40000" dist="23000" dir="5400000" rotWithShape="0">
+            <a:outerShdw blurRad="50800" dist="50800" dir="5400000" sx="96000" sy="96000" rotWithShape="0">
               <a:srgbClr val="000000">
-                <a:alpha val="35000"/>
-              </a:srgbClr>
-            </a:outerShdw>
-          </a:effectLst>
-        </a:effectStyle>
-        <a:effectStyle>
-          <a:effectLst>
-            <a:outerShdw blurRad="40000" dist="23000" dir="5400000" rotWithShape="0">
-              <a:srgbClr val="000000">
-                <a:alpha val="35000"/>
+                <a:alpha val="48000"/>
               </a:srgbClr>
             </a:outerShdw>
           </a:effectLst>
@@ -4750,12 +4644,12 @@
             <a:camera prst="orthographicFront">
               <a:rot lat="0" lon="0" rev="0"/>
             </a:camera>
-            <a:lightRig rig="threePt" dir="t">
-              <a:rot lat="0" lon="0" rev="1200000"/>
+            <a:lightRig rig="balanced" dir="t">
+              <a:rot lat="0" lon="0" rev="1080000"/>
             </a:lightRig>
           </a:scene3d>
           <a:sp3d>
-            <a:bevelT w="63500" h="25400"/>
+            <a:bevelT w="38100" h="12700" prst="softRound"/>
           </a:sp3d>
         </a:effectStyle>
       </a:effectStyleLst>
@@ -4763,44 +4657,21 @@
         <a:solidFill>
           <a:schemeClr val="phClr"/>
         </a:solidFill>
+        <a:solidFill>
+          <a:schemeClr val="phClr"/>
+        </a:solidFill>
         <a:gradFill rotWithShape="1">
           <a:gsLst>
             <a:gs pos="0">
               <a:schemeClr val="phClr">
-                <a:tint val="40000"/>
-                <a:satMod val="350000"/>
-              </a:schemeClr>
-            </a:gs>
-            <a:gs pos="40000">
-              <a:schemeClr val="phClr">
-                <a:tint val="45000"/>
-                <a:shade val="99000"/>
-                <a:satMod val="350000"/>
+                <a:tint val="94000"/>
+                <a:satMod val="80000"/>
+                <a:lumMod val="106000"/>
               </a:schemeClr>
             </a:gs>
             <a:gs pos="100000">
               <a:schemeClr val="phClr">
-                <a:shade val="20000"/>
-                <a:satMod val="255000"/>
-              </a:schemeClr>
-            </a:gs>
-          </a:gsLst>
-          <a:path path="circle">
-            <a:fillToRect l="50000" t="-80000" r="50000" b="180000"/>
-          </a:path>
-        </a:gradFill>
-        <a:gradFill rotWithShape="1">
-          <a:gsLst>
-            <a:gs pos="0">
-              <a:schemeClr val="phClr">
-                <a:tint val="80000"/>
-                <a:satMod val="300000"/>
-              </a:schemeClr>
-            </a:gs>
-            <a:gs pos="100000">
-              <a:schemeClr val="phClr">
-                <a:shade val="30000"/>
-                <a:satMod val="200000"/>
+                <a:shade val="80000"/>
               </a:schemeClr>
             </a:gs>
           </a:gsLst>
@@ -4811,46 +4682,12 @@
       </a:bgFillStyleLst>
     </a:fmtScheme>
   </a:themeElements>
-  <a:objectDefaults>
-    <a:spDef>
-      <a:spPr/>
-      <a:bodyPr/>
-      <a:lstStyle/>
-      <a:style>
-        <a:lnRef idx="1">
-          <a:schemeClr val="accent1"/>
-        </a:lnRef>
-        <a:fillRef idx="3">
-          <a:schemeClr val="accent1"/>
-        </a:fillRef>
-        <a:effectRef idx="2">
-          <a:schemeClr val="accent1"/>
-        </a:effectRef>
-        <a:fontRef idx="minor">
-          <a:schemeClr val="lt1"/>
-        </a:fontRef>
-      </a:style>
-    </a:spDef>
-    <a:lnDef>
-      <a:spPr/>
-      <a:bodyPr/>
-      <a:lstStyle/>
-      <a:style>
-        <a:lnRef idx="2">
-          <a:schemeClr val="accent1"/>
-        </a:lnRef>
-        <a:fillRef idx="0">
-          <a:schemeClr val="accent1"/>
-        </a:fillRef>
-        <a:effectRef idx="1">
-          <a:schemeClr val="accent1"/>
-        </a:effectRef>
-        <a:fontRef idx="minor">
-          <a:schemeClr val="tx1"/>
-        </a:fontRef>
-      </a:style>
-    </a:lnDef>
-  </a:objectDefaults>
+  <a:objectDefaults/>
   <a:extraClrSchemeLst/>
+  <a:extLst>
+    <a:ext uri="{05A4C25C-085E-4340-85A3-A5531E510DB2}">
+      <thm15:themeFamily xmlns:thm15="http://schemas.microsoft.com/office/thememl/2012/main" name="Gallery" id="{BBFCD31E-59A1-489D-B089-A3EAD7CAE12E}" vid="{F5E91637-A7B6-4E27-B710-77DA7014EE1E}"/>
+    </a:ext>
+  </a:extLst>
 </a:theme>
 </file>
</xml_diff>